<commit_message>
Update 7-Advanced Terraform Features.pptx
</commit_message>
<xml_diff>
--- a/slides/7-Advanced Terraform Features.pptx
+++ b/slides/7-Advanced Terraform Features.pptx
@@ -902,7 +902,7 @@
 </file>
 
 <file path=ppt/diagrams/colors2.xml><?xml version="1.0" encoding="utf-8"?>
-<dgm:colorsDef xmlns:dgm="http://schemas.openxmlformats.org/drawingml/2006/diagram" xmlns:a="http://schemas.openxmlformats.org/drawingml/2006/main" uniqueId="urn:microsoft.com/office/officeart/2005/8/colors/colorful1">
+<dgm:colorsDef xmlns:dgm="http://schemas.openxmlformats.org/drawingml/2006/diagram" xmlns:a="http://schemas.openxmlformats.org/drawingml/2006/main" uniqueId="urn:microsoft.com/office/officeart/2018/5/colors/Iconchunking_neutralbg_colorful1">
   <dgm:title val=""/>
   <dgm:desc val=""/>
   <dgm:catLst>
@@ -929,7 +929,9 @@
       <a:schemeClr val="accent6"/>
     </dgm:fillClrLst>
     <dgm:linClrLst meth="repeat">
-      <a:schemeClr val="lt1"/>
+      <a:schemeClr val="lt1">
+        <a:alpha val="0"/>
+      </a:schemeClr>
     </dgm:linClrLst>
     <dgm:effectClrLst/>
     <dgm:txLinClrLst/>
@@ -1736,8 +1738,8 @@
   </dgm:styleLbl>
   <dgm:styleLbl name="bgShp">
     <dgm:fillClrLst meth="repeat">
-      <a:schemeClr val="accent2">
-        <a:tint val="40000"/>
+      <a:schemeClr val="bg1">
+        <a:lumMod val="95000"/>
       </a:schemeClr>
     </dgm:fillClrLst>
     <dgm:linClrLst meth="repeat">
@@ -2354,10 +2356,10 @@
     <dgm:cxn modelId="{596DBD21-4DE4-3A45-96FD-C8EDB47E257B}" type="presOf" srcId="{D503AA80-9917-41A8-89DF-1D1337AC7468}" destId="{EB54762C-538D-A845-8BB5-8868738DFAC2}" srcOrd="0" destOrd="0" presId="urn:microsoft.com/office/officeart/2009/3/layout/HorizontalOrganizationChart"/>
     <dgm:cxn modelId="{458EA132-B3B8-ED40-9163-A83FD09A880D}" type="presOf" srcId="{5AC17ED1-1F84-4188-93BF-4768D0B651A3}" destId="{52D0A26B-DED5-E243-B813-889B8A0CBA4B}" srcOrd="0" destOrd="0" presId="urn:microsoft.com/office/officeart/2009/3/layout/HorizontalOrganizationChart"/>
     <dgm:cxn modelId="{6A82C83E-2801-A441-96F0-991F3DAD74D8}" type="presOf" srcId="{D503AA80-9917-41A8-89DF-1D1337AC7468}" destId="{F97A640C-3E67-8145-90CB-8C26B7527F08}" srcOrd="1" destOrd="0" presId="urn:microsoft.com/office/officeart/2009/3/layout/HorizontalOrganizationChart"/>
-    <dgm:cxn modelId="{8D065B56-0EC3-0643-A2A0-D0F9CAE54B85}" type="presOf" srcId="{D4EF0DFB-39E0-4EE6-85D3-A50ABB39F8AB}" destId="{FC6E2A41-9A6C-2C49-8690-A3059A059762}" srcOrd="0" destOrd="0" presId="urn:microsoft.com/office/officeart/2009/3/layout/HorizontalOrganizationChart"/>
     <dgm:cxn modelId="{6FB17E5E-10C6-3D40-9D1D-65F0021EF9A6}" type="presOf" srcId="{CFA8ABBB-2A88-46AB-AD2F-02B6BE20C3BA}" destId="{39EA16A1-1CE7-B046-8AE4-A1603AA8DB70}" srcOrd="1" destOrd="0" presId="urn:microsoft.com/office/officeart/2009/3/layout/HorizontalOrganizationChart"/>
     <dgm:cxn modelId="{635C745F-ACEB-104F-9130-342E0568921E}" type="presOf" srcId="{245A5BA4-4BA3-4793-9583-40BC6ECF6042}" destId="{06A0D61C-169F-7E41-BDFB-64AB9D2158BF}" srcOrd="0" destOrd="0" presId="urn:microsoft.com/office/officeart/2009/3/layout/HorizontalOrganizationChart"/>
     <dgm:cxn modelId="{2A4CDC6D-8303-4E25-BDAB-3608221B6581}" srcId="{5318D52A-E381-463B-8803-3DB125497FB7}" destId="{8BE98BAF-4C7F-4401-A2D0-F4A13A0C0D51}" srcOrd="1" destOrd="0" parTransId="{240E8C4B-9564-412C-8898-23DF06C37969}" sibTransId="{8C1CFE42-DE41-4CF2-9399-0920EE2CFB27}"/>
+    <dgm:cxn modelId="{8D065B56-0EC3-0643-A2A0-D0F9CAE54B85}" type="presOf" srcId="{D4EF0DFB-39E0-4EE6-85D3-A50ABB39F8AB}" destId="{FC6E2A41-9A6C-2C49-8690-A3059A059762}" srcOrd="0" destOrd="0" presId="urn:microsoft.com/office/officeart/2009/3/layout/HorizontalOrganizationChart"/>
     <dgm:cxn modelId="{3F2FDC99-B249-5A41-A026-FECF3438C715}" type="presOf" srcId="{AE1ED185-A347-45EE-B351-5A96F3AA17B9}" destId="{0EF9DA84-0F24-C94A-826A-7A0E2D49C424}" srcOrd="1" destOrd="0" presId="urn:microsoft.com/office/officeart/2009/3/layout/HorizontalOrganizationChart"/>
     <dgm:cxn modelId="{76BC759C-009F-48A4-AEBB-C2CA07DFC14C}" srcId="{D4EF0DFB-39E0-4EE6-85D3-A50ABB39F8AB}" destId="{D503AA80-9917-41A8-89DF-1D1337AC7468}" srcOrd="1" destOrd="0" parTransId="{245A5BA4-4BA3-4793-9583-40BC6ECF6042}" sibTransId="{048EC38E-E708-4460-8630-E6B94832CCB4}"/>
     <dgm:cxn modelId="{7E0DF59C-CC53-6245-BC43-190408129BBB}" type="presOf" srcId="{895045AE-0CF4-4D77-9C4E-F25C2907B561}" destId="{7B60B3F0-1616-FF4E-A519-8518C0869A86}" srcOrd="0" destOrd="0" presId="urn:microsoft.com/office/officeart/2009/3/layout/HorizontalOrganizationChart"/>
@@ -2435,7 +2437,7 @@
 <dgm:dataModel xmlns:dgm="http://schemas.openxmlformats.org/drawingml/2006/diagram" xmlns:a="http://schemas.openxmlformats.org/drawingml/2006/main">
   <dgm:ptLst>
     <dgm:pt modelId="{61ACCF91-F6A7-4544-8271-6160DD79B09F}" type="doc">
-      <dgm:prSet loTypeId="urn:microsoft.com/office/officeart/2018/5/layout/CenteredIconLabelDescriptionList" loCatId="icon" qsTypeId="urn:microsoft.com/office/officeart/2005/8/quickstyle/simple1" qsCatId="simple" csTypeId="urn:microsoft.com/office/officeart/2005/8/colors/colorful1" csCatId="colorful" phldr="1"/>
+      <dgm:prSet loTypeId="urn:microsoft.com/office/officeart/2018/2/layout/IconVerticalSolidList" loCatId="icon" qsTypeId="urn:microsoft.com/office/officeart/2005/8/quickstyle/simple1" qsCatId="simple" csTypeId="urn:microsoft.com/office/officeart/2018/5/colors/Iconchunking_neutralbg_colorful1" csCatId="colorful" phldr="1"/>
       <dgm:spPr/>
       <dgm:t>
         <a:bodyPr/>
@@ -2456,13 +2458,12 @@
             <a:lnSpc>
               <a:spcPct val="100000"/>
             </a:lnSpc>
-            <a:defRPr b="1"/>
           </a:pPr>
           <a:r>
-            <a:rPr lang="en-US" baseline="0"/>
+            <a:rPr lang="en-US" baseline="0" dirty="0"/>
             <a:t>Definition: Terraform functions are built-in utilities that allow you to manipulate data, perform calculations, and create more dynamic configurations.</a:t>
           </a:r>
-          <a:endParaRPr lang="en-US"/>
+          <a:endParaRPr lang="en-US" dirty="0"/>
         </a:p>
       </dgm:t>
     </dgm:pt>
@@ -2499,7 +2500,6 @@
             <a:lnSpc>
               <a:spcPct val="100000"/>
             </a:lnSpc>
-            <a:defRPr b="1"/>
           </a:pPr>
           <a:r>
             <a:rPr lang="en-US" baseline="0"/>
@@ -2531,7 +2531,7 @@
         </a:p>
       </dgm:t>
     </dgm:pt>
-    <dgm:pt modelId="{33B6AADB-201C-4A4C-9C24-552024EF0DD6}" type="pres">
+    <dgm:pt modelId="{8DDD4702-735F-43AA-987F-285393D40EAC}" type="pres">
       <dgm:prSet presAssocID="{61ACCF91-F6A7-4544-8271-6160DD79B09F}" presName="root" presStyleCnt="0">
         <dgm:presLayoutVars>
           <dgm:dir/>
@@ -2540,11 +2540,15 @@
       </dgm:prSet>
       <dgm:spPr/>
     </dgm:pt>
-    <dgm:pt modelId="{1507F82C-2AA3-44B4-80E4-E10E64713629}" type="pres">
+    <dgm:pt modelId="{A5264290-DA18-4AE9-82EB-25F06815780D}" type="pres">
       <dgm:prSet presAssocID="{B94C01AE-F464-4AEC-AE5B-B2A6B76DCE33}" presName="compNode" presStyleCnt="0"/>
       <dgm:spPr/>
     </dgm:pt>
-    <dgm:pt modelId="{CEAED0AC-FE4C-4C52-A570-6062F770E39A}" type="pres">
+    <dgm:pt modelId="{C45FB36E-64E4-4838-91B1-5BD0924F3F10}" type="pres">
+      <dgm:prSet presAssocID="{B94C01AE-F464-4AEC-AE5B-B2A6B76DCE33}" presName="bgRect" presStyleLbl="bgShp" presStyleIdx="0" presStyleCnt="2"/>
+      <dgm:spPr/>
+    </dgm:pt>
+    <dgm:pt modelId="{8288D16D-3BCA-498D-BE65-B354B8FE717F}" type="pres">
       <dgm:prSet presAssocID="{B94C01AE-F464-4AEC-AE5B-B2A6B76DCE33}" presName="iconRect" presStyleLbl="node1" presStyleIdx="0" presStyleCnt="2"/>
       <dgm:spPr>
         <a:blipFill>
@@ -2562,6 +2566,9 @@
             <a:fillRect/>
           </a:stretch>
         </a:blipFill>
+        <a:ln>
+          <a:noFill/>
+        </a:ln>
       </dgm:spPr>
       <dgm:extLst>
         <a:ext uri="{E40237B7-FDA0-4F09-8148-C483321AD2D9}">
@@ -2569,12 +2576,12 @@
         </a:ext>
       </dgm:extLst>
     </dgm:pt>
-    <dgm:pt modelId="{19BF544C-03EA-4033-B34F-72AE811744C3}" type="pres">
-      <dgm:prSet presAssocID="{B94C01AE-F464-4AEC-AE5B-B2A6B76DCE33}" presName="iconSpace" presStyleCnt="0"/>
+    <dgm:pt modelId="{5B798C6F-99B0-4C64-9EF4-52DDDD3C7647}" type="pres">
+      <dgm:prSet presAssocID="{B94C01AE-F464-4AEC-AE5B-B2A6B76DCE33}" presName="spaceRect" presStyleCnt="0"/>
       <dgm:spPr/>
     </dgm:pt>
-    <dgm:pt modelId="{45093833-ABC3-4787-915A-BD78D5572A30}" type="pres">
-      <dgm:prSet presAssocID="{B94C01AE-F464-4AEC-AE5B-B2A6B76DCE33}" presName="parTx" presStyleLbl="revTx" presStyleIdx="0" presStyleCnt="4">
+    <dgm:pt modelId="{46527AEB-F625-4021-B8FD-A51D91412994}" type="pres">
+      <dgm:prSet presAssocID="{B94C01AE-F464-4AEC-AE5B-B2A6B76DCE33}" presName="parTx" presStyleLbl="revTx" presStyleIdx="0" presStyleCnt="2">
         <dgm:presLayoutVars>
           <dgm:chMax val="0"/>
           <dgm:chPref val="0"/>
@@ -2582,25 +2589,19 @@
       </dgm:prSet>
       <dgm:spPr/>
     </dgm:pt>
-    <dgm:pt modelId="{0B3AD97D-3061-4FCA-981C-AC50F31B0567}" type="pres">
-      <dgm:prSet presAssocID="{B94C01AE-F464-4AEC-AE5B-B2A6B76DCE33}" presName="txSpace" presStyleCnt="0"/>
-      <dgm:spPr/>
-    </dgm:pt>
-    <dgm:pt modelId="{7DF7BDBD-3CE4-4317-AEE4-1923DDA7F3AF}" type="pres">
-      <dgm:prSet presAssocID="{B94C01AE-F464-4AEC-AE5B-B2A6B76DCE33}" presName="desTx" presStyleLbl="revTx" presStyleIdx="1" presStyleCnt="4">
-        <dgm:presLayoutVars/>
-      </dgm:prSet>
-      <dgm:spPr/>
-    </dgm:pt>
-    <dgm:pt modelId="{0FFD61E8-4F21-43BC-9C2F-D2F6B34297CF}" type="pres">
+    <dgm:pt modelId="{9E5F5353-7DFB-4BF2-9993-D3FCA098BC0C}" type="pres">
       <dgm:prSet presAssocID="{5DEB234B-008D-4B75-9303-AB8E7FBA408D}" presName="sibTrans" presStyleCnt="0"/>
       <dgm:spPr/>
     </dgm:pt>
-    <dgm:pt modelId="{8007FB56-1903-4052-8BDE-9AEA01AAF2DC}" type="pres">
+    <dgm:pt modelId="{A86A2504-984D-41BF-81D6-869B5B664568}" type="pres">
       <dgm:prSet presAssocID="{F88E724A-C479-4170-9071-21F654667395}" presName="compNode" presStyleCnt="0"/>
       <dgm:spPr/>
     </dgm:pt>
-    <dgm:pt modelId="{A943771B-8B8B-473D-8927-A78ADF908870}" type="pres">
+    <dgm:pt modelId="{C9C6B518-D464-464E-8CDB-BDA184D2810D}" type="pres">
+      <dgm:prSet presAssocID="{F88E724A-C479-4170-9071-21F654667395}" presName="bgRect" presStyleLbl="bgShp" presStyleIdx="1" presStyleCnt="2"/>
+      <dgm:spPr/>
+    </dgm:pt>
+    <dgm:pt modelId="{007D7692-064C-4751-B110-B34EE2674A7A}" type="pres">
       <dgm:prSet presAssocID="{F88E724A-C479-4170-9071-21F654667395}" presName="iconRect" presStyleLbl="node1" presStyleIdx="1" presStyleCnt="2"/>
       <dgm:spPr>
         <a:blipFill>
@@ -2618,19 +2619,22 @@
             <a:fillRect/>
           </a:stretch>
         </a:blipFill>
+        <a:ln>
+          <a:noFill/>
+        </a:ln>
       </dgm:spPr>
       <dgm:extLst>
         <a:ext uri="{E40237B7-FDA0-4F09-8148-C483321AD2D9}">
-          <dgm14:cNvPr xmlns:dgm14="http://schemas.microsoft.com/office/drawing/2010/diagram" id="0" name="" descr="Violin"/>
+          <dgm14:cNvPr xmlns:dgm14="http://schemas.microsoft.com/office/drawing/2010/diagram" id="0" name="" descr="Document"/>
         </a:ext>
       </dgm:extLst>
     </dgm:pt>
-    <dgm:pt modelId="{4C045D5D-8374-4E0D-8DF2-7F6DE54CC095}" type="pres">
-      <dgm:prSet presAssocID="{F88E724A-C479-4170-9071-21F654667395}" presName="iconSpace" presStyleCnt="0"/>
+    <dgm:pt modelId="{67F1FBBD-A5F8-4DD5-89A0-1040CB8C7E5D}" type="pres">
+      <dgm:prSet presAssocID="{F88E724A-C479-4170-9071-21F654667395}" presName="spaceRect" presStyleCnt="0"/>
       <dgm:spPr/>
     </dgm:pt>
-    <dgm:pt modelId="{D30F889C-F25D-4ACC-9ED4-03FBDFF84E66}" type="pres">
-      <dgm:prSet presAssocID="{F88E724A-C479-4170-9071-21F654667395}" presName="parTx" presStyleLbl="revTx" presStyleIdx="2" presStyleCnt="4">
+    <dgm:pt modelId="{58FE4C93-120B-4C52-9DE2-E82E17B9425C}" type="pres">
+      <dgm:prSet presAssocID="{F88E724A-C479-4170-9071-21F654667395}" presName="parTx" presStyleLbl="revTx" presStyleIdx="1" presStyleCnt="2">
         <dgm:presLayoutVars>
           <dgm:chMax val="0"/>
           <dgm:chPref val="0"/>
@@ -2638,36 +2642,24 @@
       </dgm:prSet>
       <dgm:spPr/>
     </dgm:pt>
-    <dgm:pt modelId="{B2861961-4708-4582-B344-1A33661FE710}" type="pres">
-      <dgm:prSet presAssocID="{F88E724A-C479-4170-9071-21F654667395}" presName="txSpace" presStyleCnt="0"/>
-      <dgm:spPr/>
-    </dgm:pt>
-    <dgm:pt modelId="{DCFD41D2-D17E-4A06-9B40-FACC79E2DC8D}" type="pres">
-      <dgm:prSet presAssocID="{F88E724A-C479-4170-9071-21F654667395}" presName="desTx" presStyleLbl="revTx" presStyleIdx="3" presStyleCnt="4" custLinFactNeighborX="-463" custLinFactNeighborY="-14352">
-        <dgm:presLayoutVars/>
-      </dgm:prSet>
-      <dgm:spPr/>
-    </dgm:pt>
   </dgm:ptLst>
   <dgm:cxnLst>
-    <dgm:cxn modelId="{74FCD229-1D33-4A53-938F-AE748A7A6BEC}" type="presOf" srcId="{B94C01AE-F464-4AEC-AE5B-B2A6B76DCE33}" destId="{45093833-ABC3-4787-915A-BD78D5572A30}" srcOrd="0" destOrd="0" presId="urn:microsoft.com/office/officeart/2018/5/layout/CenteredIconLabelDescriptionList"/>
-    <dgm:cxn modelId="{2D813541-7AEA-4465-820C-DD5B46A168AA}" type="presOf" srcId="{61ACCF91-F6A7-4544-8271-6160DD79B09F}" destId="{33B6AADB-201C-4A4C-9C24-552024EF0DD6}" srcOrd="0" destOrd="0" presId="urn:microsoft.com/office/officeart/2018/5/layout/CenteredIconLabelDescriptionList"/>
+    <dgm:cxn modelId="{AF645C07-A877-41FC-BDD2-1BD6B9148144}" type="presOf" srcId="{B94C01AE-F464-4AEC-AE5B-B2A6B76DCE33}" destId="{46527AEB-F625-4021-B8FD-A51D91412994}" srcOrd="0" destOrd="0" presId="urn:microsoft.com/office/officeart/2018/2/layout/IconVerticalSolidList"/>
     <dgm:cxn modelId="{15FF5965-6F78-468D-87EA-200BF234C6E1}" srcId="{61ACCF91-F6A7-4544-8271-6160DD79B09F}" destId="{F88E724A-C479-4170-9071-21F654667395}" srcOrd="1" destOrd="0" parTransId="{7ED312F4-9BA6-4A9B-A30C-E137B9375F96}" sibTransId="{111DBD00-E2C3-47E2-999D-A0E21361ED09}"/>
-    <dgm:cxn modelId="{25DC299A-86C1-4D2E-A488-AFA82421DA6B}" type="presOf" srcId="{F88E724A-C479-4170-9071-21F654667395}" destId="{D30F889C-F25D-4ACC-9ED4-03FBDFF84E66}" srcOrd="0" destOrd="0" presId="urn:microsoft.com/office/officeart/2018/5/layout/CenteredIconLabelDescriptionList"/>
+    <dgm:cxn modelId="{53DDB172-974F-4830-9BE2-0C8904B71416}" type="presOf" srcId="{F88E724A-C479-4170-9071-21F654667395}" destId="{58FE4C93-120B-4C52-9DE2-E82E17B9425C}" srcOrd="0" destOrd="0" presId="urn:microsoft.com/office/officeart/2018/2/layout/IconVerticalSolidList"/>
+    <dgm:cxn modelId="{023580AC-5CED-4007-B6A5-4476CAE0D8BB}" type="presOf" srcId="{61ACCF91-F6A7-4544-8271-6160DD79B09F}" destId="{8DDD4702-735F-43AA-987F-285393D40EAC}" srcOrd="0" destOrd="0" presId="urn:microsoft.com/office/officeart/2018/2/layout/IconVerticalSolidList"/>
     <dgm:cxn modelId="{798E12AD-CCFE-4025-9313-87CC242AF4C5}" srcId="{61ACCF91-F6A7-4544-8271-6160DD79B09F}" destId="{B94C01AE-F464-4AEC-AE5B-B2A6B76DCE33}" srcOrd="0" destOrd="0" parTransId="{4AD76946-ED88-47AC-B7BC-8564EFC24714}" sibTransId="{5DEB234B-008D-4B75-9303-AB8E7FBA408D}"/>
-    <dgm:cxn modelId="{26F2A6DC-E81F-403B-B360-7217A2C85194}" type="presParOf" srcId="{33B6AADB-201C-4A4C-9C24-552024EF0DD6}" destId="{1507F82C-2AA3-44B4-80E4-E10E64713629}" srcOrd="0" destOrd="0" presId="urn:microsoft.com/office/officeart/2018/5/layout/CenteredIconLabelDescriptionList"/>
-    <dgm:cxn modelId="{B30A3F53-7140-42E3-95B3-65B45BC4A566}" type="presParOf" srcId="{1507F82C-2AA3-44B4-80E4-E10E64713629}" destId="{CEAED0AC-FE4C-4C52-A570-6062F770E39A}" srcOrd="0" destOrd="0" presId="urn:microsoft.com/office/officeart/2018/5/layout/CenteredIconLabelDescriptionList"/>
-    <dgm:cxn modelId="{9A53E211-593A-4564-A0AD-755BEDD1029A}" type="presParOf" srcId="{1507F82C-2AA3-44B4-80E4-E10E64713629}" destId="{19BF544C-03EA-4033-B34F-72AE811744C3}" srcOrd="1" destOrd="0" presId="urn:microsoft.com/office/officeart/2018/5/layout/CenteredIconLabelDescriptionList"/>
-    <dgm:cxn modelId="{CCC2540C-2601-437B-BF7F-AA14C2DB76A1}" type="presParOf" srcId="{1507F82C-2AA3-44B4-80E4-E10E64713629}" destId="{45093833-ABC3-4787-915A-BD78D5572A30}" srcOrd="2" destOrd="0" presId="urn:microsoft.com/office/officeart/2018/5/layout/CenteredIconLabelDescriptionList"/>
-    <dgm:cxn modelId="{F4CA7E91-349F-48B4-A6CF-3F26C51EDAF0}" type="presParOf" srcId="{1507F82C-2AA3-44B4-80E4-E10E64713629}" destId="{0B3AD97D-3061-4FCA-981C-AC50F31B0567}" srcOrd="3" destOrd="0" presId="urn:microsoft.com/office/officeart/2018/5/layout/CenteredIconLabelDescriptionList"/>
-    <dgm:cxn modelId="{93C186D3-E3BF-477C-8518-8E4B24204A7A}" type="presParOf" srcId="{1507F82C-2AA3-44B4-80E4-E10E64713629}" destId="{7DF7BDBD-3CE4-4317-AEE4-1923DDA7F3AF}" srcOrd="4" destOrd="0" presId="urn:microsoft.com/office/officeart/2018/5/layout/CenteredIconLabelDescriptionList"/>
-    <dgm:cxn modelId="{78F19347-C4D0-471A-839B-41DD652F361D}" type="presParOf" srcId="{33B6AADB-201C-4A4C-9C24-552024EF0DD6}" destId="{0FFD61E8-4F21-43BC-9C2F-D2F6B34297CF}" srcOrd="1" destOrd="0" presId="urn:microsoft.com/office/officeart/2018/5/layout/CenteredIconLabelDescriptionList"/>
-    <dgm:cxn modelId="{384CBDC1-9A02-4872-8FAB-891A89F90A90}" type="presParOf" srcId="{33B6AADB-201C-4A4C-9C24-552024EF0DD6}" destId="{8007FB56-1903-4052-8BDE-9AEA01AAF2DC}" srcOrd="2" destOrd="0" presId="urn:microsoft.com/office/officeart/2018/5/layout/CenteredIconLabelDescriptionList"/>
-    <dgm:cxn modelId="{FAE6D097-1ADC-456D-9653-A820133A5ABC}" type="presParOf" srcId="{8007FB56-1903-4052-8BDE-9AEA01AAF2DC}" destId="{A943771B-8B8B-473D-8927-A78ADF908870}" srcOrd="0" destOrd="0" presId="urn:microsoft.com/office/officeart/2018/5/layout/CenteredIconLabelDescriptionList"/>
-    <dgm:cxn modelId="{F73D9A95-8CD0-46D3-B32E-5FBB72689B9C}" type="presParOf" srcId="{8007FB56-1903-4052-8BDE-9AEA01AAF2DC}" destId="{4C045D5D-8374-4E0D-8DF2-7F6DE54CC095}" srcOrd="1" destOrd="0" presId="urn:microsoft.com/office/officeart/2018/5/layout/CenteredIconLabelDescriptionList"/>
-    <dgm:cxn modelId="{A88DBD32-9842-4F49-BE5C-CBDBB9087BB8}" type="presParOf" srcId="{8007FB56-1903-4052-8BDE-9AEA01AAF2DC}" destId="{D30F889C-F25D-4ACC-9ED4-03FBDFF84E66}" srcOrd="2" destOrd="0" presId="urn:microsoft.com/office/officeart/2018/5/layout/CenteredIconLabelDescriptionList"/>
-    <dgm:cxn modelId="{1DBF64CF-6B28-46FC-9936-BF2372DDC232}" type="presParOf" srcId="{8007FB56-1903-4052-8BDE-9AEA01AAF2DC}" destId="{B2861961-4708-4582-B344-1A33661FE710}" srcOrd="3" destOrd="0" presId="urn:microsoft.com/office/officeart/2018/5/layout/CenteredIconLabelDescriptionList"/>
-    <dgm:cxn modelId="{863EF9D5-2AB4-4BC8-A771-9B671B5F3DFE}" type="presParOf" srcId="{8007FB56-1903-4052-8BDE-9AEA01AAF2DC}" destId="{DCFD41D2-D17E-4A06-9B40-FACC79E2DC8D}" srcOrd="4" destOrd="0" presId="urn:microsoft.com/office/officeart/2018/5/layout/CenteredIconLabelDescriptionList"/>
+    <dgm:cxn modelId="{3262CBD9-922F-44E5-A634-76E4FA579417}" type="presParOf" srcId="{8DDD4702-735F-43AA-987F-285393D40EAC}" destId="{A5264290-DA18-4AE9-82EB-25F06815780D}" srcOrd="0" destOrd="0" presId="urn:microsoft.com/office/officeart/2018/2/layout/IconVerticalSolidList"/>
+    <dgm:cxn modelId="{5CB7AB27-6D43-425E-A427-C4DBBD48B041}" type="presParOf" srcId="{A5264290-DA18-4AE9-82EB-25F06815780D}" destId="{C45FB36E-64E4-4838-91B1-5BD0924F3F10}" srcOrd="0" destOrd="0" presId="urn:microsoft.com/office/officeart/2018/2/layout/IconVerticalSolidList"/>
+    <dgm:cxn modelId="{8B03A5FF-5AC9-4525-8CFC-991F680CB976}" type="presParOf" srcId="{A5264290-DA18-4AE9-82EB-25F06815780D}" destId="{8288D16D-3BCA-498D-BE65-B354B8FE717F}" srcOrd="1" destOrd="0" presId="urn:microsoft.com/office/officeart/2018/2/layout/IconVerticalSolidList"/>
+    <dgm:cxn modelId="{70FFB8DB-625A-4433-9460-446CBE67796E}" type="presParOf" srcId="{A5264290-DA18-4AE9-82EB-25F06815780D}" destId="{5B798C6F-99B0-4C64-9EF4-52DDDD3C7647}" srcOrd="2" destOrd="0" presId="urn:microsoft.com/office/officeart/2018/2/layout/IconVerticalSolidList"/>
+    <dgm:cxn modelId="{AA884CEC-62E3-4883-A418-2DB68AD98F0D}" type="presParOf" srcId="{A5264290-DA18-4AE9-82EB-25F06815780D}" destId="{46527AEB-F625-4021-B8FD-A51D91412994}" srcOrd="3" destOrd="0" presId="urn:microsoft.com/office/officeart/2018/2/layout/IconVerticalSolidList"/>
+    <dgm:cxn modelId="{CDB5F680-9B51-46BB-AE5D-86162AABF430}" type="presParOf" srcId="{8DDD4702-735F-43AA-987F-285393D40EAC}" destId="{9E5F5353-7DFB-4BF2-9993-D3FCA098BC0C}" srcOrd="1" destOrd="0" presId="urn:microsoft.com/office/officeart/2018/2/layout/IconVerticalSolidList"/>
+    <dgm:cxn modelId="{FB428F7C-BF8F-4054-B9B5-11312024B6F9}" type="presParOf" srcId="{8DDD4702-735F-43AA-987F-285393D40EAC}" destId="{A86A2504-984D-41BF-81D6-869B5B664568}" srcOrd="2" destOrd="0" presId="urn:microsoft.com/office/officeart/2018/2/layout/IconVerticalSolidList"/>
+    <dgm:cxn modelId="{FEE4255D-9CA9-4081-947E-0EC73E6FBF4E}" type="presParOf" srcId="{A86A2504-984D-41BF-81D6-869B5B664568}" destId="{C9C6B518-D464-464E-8CDB-BDA184D2810D}" srcOrd="0" destOrd="0" presId="urn:microsoft.com/office/officeart/2018/2/layout/IconVerticalSolidList"/>
+    <dgm:cxn modelId="{55466E28-777C-46A1-AC89-42134DF70854}" type="presParOf" srcId="{A86A2504-984D-41BF-81D6-869B5B664568}" destId="{007D7692-064C-4751-B110-B34EE2674A7A}" srcOrd="1" destOrd="0" presId="urn:microsoft.com/office/officeart/2018/2/layout/IconVerticalSolidList"/>
+    <dgm:cxn modelId="{9D50F18F-BAB7-4A59-83BF-36EA09C43094}" type="presParOf" srcId="{A86A2504-984D-41BF-81D6-869B5B664568}" destId="{67F1FBBD-A5F8-4DD5-89A0-1040CB8C7E5D}" srcOrd="2" destOrd="0" presId="urn:microsoft.com/office/officeart/2018/2/layout/IconVerticalSolidList"/>
+    <dgm:cxn modelId="{758B28F6-ACF1-409B-87FF-A3E2C87127E7}" type="presParOf" srcId="{A86A2504-984D-41BF-81D6-869B5B664568}" destId="{58FE4C93-120B-4C52-9DE2-E82E17B9425C}" srcOrd="3" destOrd="0" presId="urn:microsoft.com/office/officeart/2018/2/layout/IconVerticalSolidList"/>
   </dgm:cxnLst>
   <dgm:bg/>
   <dgm:whole/>
@@ -3485,15 +3477,57 @@
       <dsp:cNvGrpSpPr/>
     </dsp:nvGrpSpPr>
     <dsp:grpSpPr/>
-    <dsp:sp modelId="{CEAED0AC-FE4C-4C52-A570-6062F770E39A}">
+    <dsp:sp modelId="{C45FB36E-64E4-4838-91B1-5BD0924F3F10}">
       <dsp:nvSpPr>
         <dsp:cNvPr id="0" name=""/>
         <dsp:cNvSpPr/>
       </dsp:nvSpPr>
       <dsp:spPr>
         <a:xfrm>
-          <a:off x="2013858" y="217628"/>
-          <a:ext cx="1512000" cy="1512000"/>
+          <a:off x="0" y="628374"/>
+          <a:ext cx="5959475" cy="1160076"/>
+        </a:xfrm>
+        <a:prstGeom prst="roundRect">
+          <a:avLst>
+            <a:gd name="adj" fmla="val 10000"/>
+          </a:avLst>
+        </a:prstGeom>
+        <a:solidFill>
+          <a:schemeClr val="bg1">
+            <a:lumMod val="95000"/>
+            <a:hueOff val="0"/>
+            <a:satOff val="0"/>
+            <a:lumOff val="0"/>
+            <a:alphaOff val="0"/>
+          </a:schemeClr>
+        </a:solidFill>
+        <a:ln>
+          <a:noFill/>
+        </a:ln>
+        <a:effectLst/>
+      </dsp:spPr>
+      <dsp:style>
+        <a:lnRef idx="0">
+          <a:scrgbClr r="0" g="0" b="0"/>
+        </a:lnRef>
+        <a:fillRef idx="1">
+          <a:scrgbClr r="0" g="0" b="0"/>
+        </a:fillRef>
+        <a:effectRef idx="0">
+          <a:scrgbClr r="0" g="0" b="0"/>
+        </a:effectRef>
+        <a:fontRef idx="minor"/>
+      </dsp:style>
+    </dsp:sp>
+    <dsp:sp modelId="{8288D16D-3BCA-498D-BE65-B354B8FE717F}">
+      <dsp:nvSpPr>
+        <dsp:cNvPr id="0" name=""/>
+        <dsp:cNvSpPr/>
+      </dsp:nvSpPr>
+      <dsp:spPr>
+        <a:xfrm>
+          <a:off x="350923" y="889392"/>
+          <a:ext cx="638042" cy="638042"/>
         </a:xfrm>
         <a:prstGeom prst="rect">
           <a:avLst/>
@@ -3514,14 +3548,7 @@
           </a:stretch>
         </a:blipFill>
         <a:ln w="34925" cap="flat" cmpd="sng" algn="in">
-          <a:solidFill>
-            <a:schemeClr val="lt1">
-              <a:hueOff val="0"/>
-              <a:satOff val="0"/>
-              <a:lumOff val="0"/>
-              <a:alphaOff val="0"/>
-            </a:schemeClr>
-          </a:solidFill>
+          <a:noFill/>
           <a:prstDash val="solid"/>
         </a:ln>
         <a:effectLst/>
@@ -3541,15 +3568,15 @@
         </a:fontRef>
       </dsp:style>
     </dsp:sp>
-    <dsp:sp modelId="{45093833-ABC3-4787-915A-BD78D5572A30}">
+    <dsp:sp modelId="{46527AEB-F625-4021-B8FD-A51D91412994}">
       <dsp:nvSpPr>
         <dsp:cNvPr id="0" name=""/>
         <dsp:cNvSpPr/>
       </dsp:nvSpPr>
       <dsp:spPr>
         <a:xfrm>
-          <a:off x="609858" y="1860583"/>
-          <a:ext cx="4320000" cy="648000"/>
+          <a:off x="1339888" y="628374"/>
+          <a:ext cx="4619586" cy="1160076"/>
         </a:xfrm>
         <a:prstGeom prst="rect">
           <a:avLst/>
@@ -3573,12 +3600,12 @@
         <a:fontRef idx="minor"/>
       </dsp:style>
       <dsp:txBody>
-        <a:bodyPr spcFirstLastPara="0" vert="horz" wrap="square" lIns="0" tIns="0" rIns="0" bIns="0" numCol="1" spcCol="1270" anchor="t" anchorCtr="0">
+        <a:bodyPr spcFirstLastPara="0" vert="horz" wrap="square" lIns="122775" tIns="122775" rIns="122775" bIns="122775" numCol="1" spcCol="1270" anchor="ctr" anchorCtr="0">
           <a:noAutofit/>
         </a:bodyPr>
         <a:lstStyle/>
         <a:p>
-          <a:pPr marL="0" lvl="0" indent="0" algn="ctr" defTabSz="622300">
+          <a:pPr marL="0" lvl="0" indent="0" algn="l" defTabSz="666750">
             <a:lnSpc>
               <a:spcPct val="100000"/>
             </a:lnSpc>
@@ -3589,34 +3616,43 @@
               <a:spcPct val="35000"/>
             </a:spcAft>
             <a:buNone/>
-            <a:defRPr b="1"/>
           </a:pPr>
           <a:r>
-            <a:rPr lang="en-US" sz="1400" kern="1200" baseline="0"/>
+            <a:rPr lang="en-US" sz="1500" kern="1200" baseline="0" dirty="0"/>
             <a:t>Definition: Terraform functions are built-in utilities that allow you to manipulate data, perform calculations, and create more dynamic configurations.</a:t>
           </a:r>
-          <a:endParaRPr lang="en-US" sz="1400" kern="1200"/>
+          <a:endParaRPr lang="en-US" sz="1500" kern="1200" dirty="0"/>
         </a:p>
       </dsp:txBody>
       <dsp:txXfrm>
-        <a:off x="609858" y="1860583"/>
-        <a:ext cx="4320000" cy="648000"/>
+        <a:off x="1339888" y="628374"/>
+        <a:ext cx="4619586" cy="1160076"/>
       </dsp:txXfrm>
     </dsp:sp>
-    <dsp:sp modelId="{7DF7BDBD-3CE4-4317-AEE4-1923DDA7F3AF}">
+    <dsp:sp modelId="{C9C6B518-D464-464E-8CDB-BDA184D2810D}">
       <dsp:nvSpPr>
         <dsp:cNvPr id="0" name=""/>
         <dsp:cNvSpPr/>
       </dsp:nvSpPr>
       <dsp:spPr>
         <a:xfrm>
-          <a:off x="609858" y="2569491"/>
-          <a:ext cx="4320000" cy="693582"/>
+          <a:off x="0" y="2078471"/>
+          <a:ext cx="5959475" cy="1160076"/>
         </a:xfrm>
-        <a:prstGeom prst="rect">
-          <a:avLst/>
+        <a:prstGeom prst="roundRect">
+          <a:avLst>
+            <a:gd name="adj" fmla="val 10000"/>
+          </a:avLst>
         </a:prstGeom>
-        <a:noFill/>
+        <a:solidFill>
+          <a:schemeClr val="bg1">
+            <a:lumMod val="95000"/>
+            <a:hueOff val="0"/>
+            <a:satOff val="0"/>
+            <a:lumOff val="0"/>
+            <a:alphaOff val="0"/>
+          </a:schemeClr>
+        </a:solidFill>
         <a:ln>
           <a:noFill/>
         </a:ln>
@@ -3626,7 +3662,7 @@
         <a:lnRef idx="0">
           <a:scrgbClr r="0" g="0" b="0"/>
         </a:lnRef>
-        <a:fillRef idx="0">
+        <a:fillRef idx="1">
           <a:scrgbClr r="0" g="0" b="0"/>
         </a:fillRef>
         <a:effectRef idx="0">
@@ -3635,15 +3671,15 @@
         <a:fontRef idx="minor"/>
       </dsp:style>
     </dsp:sp>
-    <dsp:sp modelId="{A943771B-8B8B-473D-8927-A78ADF908870}">
+    <dsp:sp modelId="{007D7692-064C-4751-B110-B34EE2674A7A}">
       <dsp:nvSpPr>
         <dsp:cNvPr id="0" name=""/>
         <dsp:cNvSpPr/>
       </dsp:nvSpPr>
       <dsp:spPr>
         <a:xfrm>
-          <a:off x="7089858" y="217628"/>
-          <a:ext cx="1512000" cy="1512000"/>
+          <a:off x="350923" y="2339488"/>
+          <a:ext cx="638042" cy="638042"/>
         </a:xfrm>
         <a:prstGeom prst="rect">
           <a:avLst/>
@@ -3664,14 +3700,7 @@
           </a:stretch>
         </a:blipFill>
         <a:ln w="34925" cap="flat" cmpd="sng" algn="in">
-          <a:solidFill>
-            <a:schemeClr val="lt1">
-              <a:hueOff val="0"/>
-              <a:satOff val="0"/>
-              <a:lumOff val="0"/>
-              <a:alphaOff val="0"/>
-            </a:schemeClr>
-          </a:solidFill>
+          <a:noFill/>
           <a:prstDash val="solid"/>
         </a:ln>
         <a:effectLst/>
@@ -3691,15 +3720,15 @@
         </a:fontRef>
       </dsp:style>
     </dsp:sp>
-    <dsp:sp modelId="{D30F889C-F25D-4ACC-9ED4-03FBDFF84E66}">
+    <dsp:sp modelId="{58FE4C93-120B-4C52-9DE2-E82E17B9425C}">
       <dsp:nvSpPr>
         <dsp:cNvPr id="0" name=""/>
         <dsp:cNvSpPr/>
       </dsp:nvSpPr>
       <dsp:spPr>
         <a:xfrm>
-          <a:off x="5685858" y="1860583"/>
-          <a:ext cx="4320000" cy="648000"/>
+          <a:off x="1339888" y="2078471"/>
+          <a:ext cx="4619586" cy="1160076"/>
         </a:xfrm>
         <a:prstGeom prst="rect">
           <a:avLst/>
@@ -3723,12 +3752,12 @@
         <a:fontRef idx="minor"/>
       </dsp:style>
       <dsp:txBody>
-        <a:bodyPr spcFirstLastPara="0" vert="horz" wrap="square" lIns="0" tIns="0" rIns="0" bIns="0" numCol="1" spcCol="1270" anchor="t" anchorCtr="0">
+        <a:bodyPr spcFirstLastPara="0" vert="horz" wrap="square" lIns="122775" tIns="122775" rIns="122775" bIns="122775" numCol="1" spcCol="1270" anchor="ctr" anchorCtr="0">
           <a:noAutofit/>
         </a:bodyPr>
         <a:lstStyle/>
         <a:p>
-          <a:pPr marL="0" lvl="0" indent="0" algn="ctr" defTabSz="622300">
+          <a:pPr marL="0" lvl="0" indent="0" algn="l" defTabSz="666750">
             <a:lnSpc>
               <a:spcPct val="100000"/>
             </a:lnSpc>
@@ -3739,51 +3768,18 @@
               <a:spcPct val="35000"/>
             </a:spcAft>
             <a:buNone/>
-            <a:defRPr b="1"/>
           </a:pPr>
           <a:r>
-            <a:rPr lang="en-US" sz="1400" kern="1200" baseline="0"/>
+            <a:rPr lang="en-US" sz="1500" kern="1200" baseline="0"/>
             <a:t>Commonly Used Functions:</a:t>
           </a:r>
-          <a:endParaRPr lang="en-US" sz="1400" kern="1200"/>
+          <a:endParaRPr lang="en-US" sz="1500" kern="1200"/>
         </a:p>
       </dsp:txBody>
       <dsp:txXfrm>
-        <a:off x="5685858" y="1860583"/>
-        <a:ext cx="4320000" cy="648000"/>
+        <a:off x="1339888" y="2078471"/>
+        <a:ext cx="4619586" cy="1160076"/>
       </dsp:txXfrm>
-    </dsp:sp>
-    <dsp:sp modelId="{DCFD41D2-D17E-4A06-9B40-FACC79E2DC8D}">
-      <dsp:nvSpPr>
-        <dsp:cNvPr id="0" name=""/>
-        <dsp:cNvSpPr/>
-      </dsp:nvSpPr>
-      <dsp:spPr>
-        <a:xfrm>
-          <a:off x="5665856" y="2469949"/>
-          <a:ext cx="4320000" cy="693582"/>
-        </a:xfrm>
-        <a:prstGeom prst="rect">
-          <a:avLst/>
-        </a:prstGeom>
-        <a:noFill/>
-        <a:ln>
-          <a:noFill/>
-        </a:ln>
-        <a:effectLst/>
-      </dsp:spPr>
-      <dsp:style>
-        <a:lnRef idx="0">
-          <a:scrgbClr r="0" g="0" b="0"/>
-        </a:lnRef>
-        <a:fillRef idx="0">
-          <a:scrgbClr r="0" g="0" b="0"/>
-        </a:fillRef>
-        <a:effectRef idx="0">
-          <a:scrgbClr r="0" g="0" b="0"/>
-        </a:effectRef>
-        <a:fontRef idx="minor"/>
-      </dsp:style>
     </dsp:sp>
   </dsp:spTree>
 </dsp:drawing>
@@ -4974,9 +4970,9 @@
 </file>
 
 <file path=ppt/diagrams/layout2.xml><?xml version="1.0" encoding="utf-8"?>
-<dgm:layoutDef xmlns:dgm="http://schemas.openxmlformats.org/drawingml/2006/diagram" xmlns:a="http://schemas.openxmlformats.org/drawingml/2006/main" uniqueId="urn:microsoft.com/office/officeart/2018/5/layout/CenteredIconLabelDescriptionList">
-  <dgm:title val="Centered Icon Label Description List"/>
-  <dgm:desc val="Use to show non-sequential or grouped chunks of information. The placeholder holds an icon or small picture, and corresponding text boxes show Level 1 and Level 2 text respectively. Works well for minimal Level 1 text accompanied by lengthier Level two text."/>
+<dgm:layoutDef xmlns:dgm="http://schemas.openxmlformats.org/drawingml/2006/diagram" xmlns:a="http://schemas.openxmlformats.org/drawingml/2006/main" uniqueId="urn:microsoft.com/office/officeart/2018/2/layout/IconVerticalSolidList">
+  <dgm:title val="Icon Vertical Solid List"/>
+  <dgm:desc val="Use to show a series of visuals from top to bottom with Level 1 or Level 1 and Level 2 text grouped in a shape. Works best with icons or small pictures with lengthier descriptions."/>
   <dgm:catLst>
     <dgm:cat type="icon" pri="500"/>
   </dgm:catLst>
@@ -5008,11 +5004,15 @@
     </dgm:varLst>
     <dgm:choose name="Name0">
       <dgm:if name="Name1" axis="self" func="var" arg="dir" op="equ" val="norm">
-        <dgm:alg type="lin"/>
+        <dgm:alg type="lin">
+          <dgm:param type="linDir" val="fromT"/>
+          <dgm:param type="nodeHorzAlign" val="l"/>
+        </dgm:alg>
       </dgm:if>
       <dgm:else name="Name2">
         <dgm:alg type="lin">
-          <dgm:param type="linDir" val="fromR"/>
+          <dgm:param type="linDir" val="fromT"/>
+          <dgm:param type="nodeHorzAlign" val="r"/>
         </dgm:alg>
       </dgm:else>
     </dgm:choose>
@@ -5020,54 +5020,140 @@
       <dgm:adjLst/>
     </dgm:shape>
     <dgm:presOf/>
-    <dgm:constrLst>
-      <dgm:constr type="h" for="ch" forName="compNode" refType="h" fact="0.45"/>
-      <dgm:constr type="w" for="ch" forName="compNode" val="120"/>
-      <dgm:constr type="w" for="ch" forName="sibTrans" refType="w" refFor="ch" refForName="compNode" fact="0.175"/>
-      <dgm:constr type="primFontSz" for="des" forName="parTx" val="36"/>
-      <dgm:constr type="primFontSz" for="des" forName="desTx" refType="primFontSz" refFor="des" refForName="parTx" op="lte" fact="0.75"/>
-      <dgm:constr type="h" for="des" forName="compNode" op="equ"/>
-      <dgm:constr type="h" for="des" forName="iconRect" op="equ"/>
-      <dgm:constr type="w" for="des" forName="iconRect" op="equ"/>
-      <dgm:constr type="h" for="des" forName="iconSpace" op="equ"/>
-      <dgm:constr type="h" for="des" forName="parTx" op="equ"/>
-      <dgm:constr type="h" for="des" forName="txSpace" op="equ"/>
-      <dgm:constr type="h" for="des" forName="desTx" op="equ"/>
-    </dgm:constrLst>
+    <dgm:choose name="Name3">
+      <dgm:if name="Name4" axis="ch" ptType="node" func="cnt" op="lte" val="3">
+        <dgm:constrLst>
+          <dgm:constr type="h" for="ch" forName="compNode" refType="h" fact="0.3"/>
+          <dgm:constr type="w" for="ch" forName="compNode" refType="w"/>
+          <dgm:constr type="h" for="ch" forName="sibTrans" refType="h" refFor="ch" refForName="compNode" fact="0.25"/>
+          <dgm:constr type="primFontSz" for="des" forName="parTx" val="25"/>
+          <dgm:constr type="primFontSz" for="des" forName="desTx" refType="primFontSz" refFor="des" refForName="parTx" op="lte" fact="0.75"/>
+          <dgm:constr type="h" for="des" forName="compNode" op="equ"/>
+          <dgm:constr type="h" for="des" forName="bgRect" op="equ"/>
+          <dgm:constr type="h" for="des" forName="iconRect" op="equ"/>
+          <dgm:constr type="w" for="des" forName="iconRect" op="equ"/>
+          <dgm:constr type="h" for="des" forName="spaceRect" op="equ"/>
+          <dgm:constr type="h" for="des" forName="parTx" op="equ"/>
+          <dgm:constr type="h" for="des" forName="desTx" op="equ"/>
+        </dgm:constrLst>
+      </dgm:if>
+      <dgm:if name="Name5" axis="ch" ptType="node" func="cnt" op="lte" val="4">
+        <dgm:constrLst>
+          <dgm:constr type="h" for="ch" forName="compNode" refType="h" fact="0.3"/>
+          <dgm:constr type="w" for="ch" forName="compNode" refType="w"/>
+          <dgm:constr type="h" for="ch" forName="sibTrans" refType="h" refFor="ch" refForName="compNode" fact="0.25"/>
+          <dgm:constr type="primFontSz" for="des" forName="parTx" val="22"/>
+          <dgm:constr type="primFontSz" for="des" forName="desTx" refType="primFontSz" refFor="des" refForName="parTx" op="lte" fact="0.75"/>
+          <dgm:constr type="h" for="des" forName="compNode" op="equ"/>
+          <dgm:constr type="h" for="des" forName="bgRect" op="equ"/>
+          <dgm:constr type="h" for="des" forName="iconRect" op="equ"/>
+          <dgm:constr type="w" for="des" forName="iconRect" op="equ"/>
+          <dgm:constr type="h" for="des" forName="spaceRect" op="equ"/>
+          <dgm:constr type="h" for="des" forName="parTx" op="equ"/>
+          <dgm:constr type="h" for="des" forName="desTx" op="equ"/>
+        </dgm:constrLst>
+      </dgm:if>
+      <dgm:if name="Name6" axis="ch" ptType="node" func="cnt" op="lte" val="6">
+        <dgm:constrLst>
+          <dgm:constr type="h" for="ch" forName="compNode" refType="h" fact="0.3"/>
+          <dgm:constr type="w" for="ch" forName="compNode" refType="w"/>
+          <dgm:constr type="h" for="ch" forName="sibTrans" refType="h" refFor="ch" refForName="compNode" fact="0.25"/>
+          <dgm:constr type="primFontSz" for="des" forName="parTx" val="19"/>
+          <dgm:constr type="primFontSz" for="des" forName="desTx" refType="primFontSz" refFor="des" refForName="parTx" op="lte" fact="0.75"/>
+          <dgm:constr type="h" for="des" forName="compNode" op="equ"/>
+          <dgm:constr type="h" for="des" forName="bgRect" op="equ"/>
+          <dgm:constr type="h" for="des" forName="iconRect" op="equ"/>
+          <dgm:constr type="w" for="des" forName="iconRect" op="equ"/>
+          <dgm:constr type="h" for="des" forName="spaceRect" op="equ"/>
+          <dgm:constr type="h" for="des" forName="parTx" op="equ"/>
+          <dgm:constr type="h" for="des" forName="desTx" op="equ"/>
+        </dgm:constrLst>
+      </dgm:if>
+      <dgm:else name="Name7">
+        <dgm:constrLst>
+          <dgm:constr type="h" for="ch" forName="compNode" refType="h" fact="0.3"/>
+          <dgm:constr type="w" for="ch" forName="compNode" refType="w"/>
+          <dgm:constr type="h" for="ch" forName="sibTrans" refType="h" refFor="ch" refForName="compNode" fact="0.25"/>
+          <dgm:constr type="primFontSz" for="des" forName="parTx" val="16"/>
+          <dgm:constr type="primFontSz" for="des" forName="desTx" refType="primFontSz" refFor="des" refForName="parTx" op="lte" fact="0.75"/>
+          <dgm:constr type="h" for="des" forName="compNode" op="equ"/>
+          <dgm:constr type="h" for="des" forName="bgRect" op="equ"/>
+          <dgm:constr type="h" for="des" forName="iconRect" op="equ"/>
+          <dgm:constr type="w" for="des" forName="iconRect" op="equ"/>
+          <dgm:constr type="h" for="des" forName="spaceRect" op="equ"/>
+          <dgm:constr type="h" for="des" forName="parTx" op="equ"/>
+          <dgm:constr type="h" for="des" forName="desTx" op="equ"/>
+        </dgm:constrLst>
+      </dgm:else>
+    </dgm:choose>
     <dgm:ruleLst>
-      <dgm:rule type="w" for="ch" forName="compNode" val="0" fact="NaN" max="NaN"/>
+      <dgm:rule type="h" for="ch" forName="compNode" val="0" fact="NaN" max="NaN"/>
     </dgm:ruleLst>
-    <dgm:forEach name="Name3" axis="ch" ptType="node">
+    <dgm:forEach name="Name8" axis="ch" ptType="node">
       <dgm:layoutNode name="compNode">
         <dgm:alg type="composite"/>
         <dgm:shape xmlns:r="http://schemas.openxmlformats.org/officeDocument/2006/relationships" r:blip="">
           <dgm:adjLst/>
         </dgm:shape>
         <dgm:presOf axis="self"/>
-        <dgm:constrLst>
-          <dgm:constr type="w" for="ch" forName="iconRect" refType="w" fact="0.35"/>
-          <dgm:constr type="h" for="ch" forName="iconRect" refType="w" refFor="ch" refForName="iconRect"/>
-          <dgm:constr type="ctrX" for="ch" forName="iconRect" refType="w" fact="0.5"/>
-          <dgm:constr type="t" for="ch" forName="iconRect"/>
-          <dgm:constr type="w" for="ch" forName="iconSpace" refType="w"/>
-          <dgm:constr type="h" for="ch" forName="iconSpace" refType="h" fact="0.043"/>
-          <dgm:constr type="l" for="ch" forName="iconSpace"/>
-          <dgm:constr type="t" for="ch" forName="iconSpace" refType="b" refFor="ch" refForName="iconRect"/>
-          <dgm:constr type="w" for="ch" forName="parTx" refType="w"/>
-          <dgm:constr type="h" for="ch" forName="parTx" refType="w" fact="0.15"/>
-          <dgm:constr type="l" for="ch" forName="parTx"/>
-          <dgm:constr type="t" for="ch" forName="parTx" refType="b" refFor="ch" refForName="iconSpace"/>
-          <dgm:constr type="h" for="ch" forName="txSpace" refType="h" fact="0.02"/>
-          <dgm:constr type="w" for="ch" forName="txSpace" refType="w"/>
-          <dgm:constr type="l" for="ch" forName="txSpace"/>
-          <dgm:constr type="t" for="ch" forName="txSpace" refType="b" refFor="ch" refForName="parTx"/>
-          <dgm:constr type="w" for="ch" forName="desTx" refType="w"/>
-          <dgm:constr type="l" for="ch" forName="desTx"/>
-          <dgm:constr type="t" for="ch" forName="desTx" refType="b" refFor="ch" refForName="txSpace"/>
-        </dgm:constrLst>
+        <dgm:choose name="Name9">
+          <dgm:if name="Name10" axis="ch" ptType="node" func="cnt" op="gte" val="1">
+            <dgm:constrLst>
+              <dgm:constr type="w" for="ch" forName="bgRect" refType="w"/>
+              <dgm:constr type="h" for="ch" forName="bgRect" refType="h"/>
+              <dgm:constr type="l" for="ch" forName="bgRect"/>
+              <dgm:constr type="t" for="ch" forName="bgRect"/>
+              <dgm:constr type="h" for="ch" forName="iconRect" refType="h" fact="0.55"/>
+              <dgm:constr type="w" for="ch" forName="iconRect" refType="h" refFor="ch" refForName="iconRect"/>
+              <dgm:constr type="l" for="ch" forName="iconRect" refType="h" refFor="ch" refForName="iconRect" fact="0.55"/>
+              <dgm:constr type="ctrY" for="ch" forName="iconRect" refType="ctrY" refFor="ch" refForName="bgRect"/>
+              <dgm:constr type="w" for="ch" forName="spaceRect" refType="l" refFor="ch" refForName="iconRect"/>
+              <dgm:constr type="h" for="ch" forName="spaceRect" refType="h"/>
+              <dgm:constr type="l" for="ch" forName="spaceRect" refType="r" refFor="ch" refForName="iconRect"/>
+              <dgm:constr type="t" for="ch" forName="spaceRect"/>
+              <dgm:constr type="w" for="ch" forName="parTx" refType="w" fact="0.45"/>
+              <dgm:constr type="h" for="ch" forName="parTx" refType="h"/>
+              <dgm:constr type="l" for="ch" forName="parTx" refType="r" refFor="ch" refForName="spaceRect"/>
+              <dgm:constr type="t" for="ch" forName="parTx"/>
+              <dgm:constr type="h" for="ch" forName="desTx" refType="h"/>
+              <dgm:constr type="l" for="ch" forName="desTx" refType="r" refFor="ch" refForName="parTx"/>
+              <dgm:constr type="t" for="ch" forName="desTx"/>
+            </dgm:constrLst>
+          </dgm:if>
+          <dgm:else name="Name11">
+            <dgm:constrLst>
+              <dgm:constr type="w" for="ch" forName="bgRect" refType="w"/>
+              <dgm:constr type="h" for="ch" forName="bgRect" refType="h"/>
+              <dgm:constr type="l" for="ch" forName="bgRect"/>
+              <dgm:constr type="t" for="ch" forName="bgRect"/>
+              <dgm:constr type="h" for="ch" forName="iconRect" refType="h" fact="0.55"/>
+              <dgm:constr type="w" for="ch" forName="iconRect" refType="h" refFor="ch" refForName="iconRect"/>
+              <dgm:constr type="l" for="ch" forName="iconRect" refType="h" refFor="ch" refForName="iconRect" fact="0.55"/>
+              <dgm:constr type="ctrY" for="ch" forName="iconRect" refType="ctrY" refFor="ch" refForName="bgRect"/>
+              <dgm:constr type="w" for="ch" forName="spaceRect" refType="l" refFor="ch" refForName="iconRect"/>
+              <dgm:constr type="h" for="ch" forName="spaceRect" refType="h"/>
+              <dgm:constr type="l" for="ch" forName="spaceRect" refType="r" refFor="ch" refForName="iconRect"/>
+              <dgm:constr type="t" for="ch" forName="spaceRect"/>
+              <dgm:constr type="h" for="ch" forName="parTx" refType="h"/>
+              <dgm:constr type="l" for="ch" forName="parTx" refType="r" refFor="ch" refForName="spaceRect"/>
+              <dgm:constr type="t" for="ch" forName="parTx"/>
+            </dgm:constrLst>
+          </dgm:else>
+        </dgm:choose>
         <dgm:ruleLst>
           <dgm:rule type="h" val="INF" fact="NaN" max="NaN"/>
         </dgm:ruleLst>
+        <dgm:layoutNode name="bgRect" styleLbl="bgShp">
+          <dgm:alg type="sp"/>
+          <dgm:shape xmlns:r="http://schemas.openxmlformats.org/officeDocument/2006/relationships" type="roundRect" r:blip="">
+            <dgm:adjLst>
+              <dgm:adj idx="1" val="0.1"/>
+            </dgm:adjLst>
+          </dgm:shape>
+          <dgm:presOf/>
+          <dgm:constrLst/>
+          <dgm:ruleLst/>
+        </dgm:layoutNode>
         <dgm:layoutNode name="iconRect" styleLbl="node1">
           <dgm:alg type="sp"/>
           <dgm:shape xmlns:r="http://schemas.openxmlformats.org/officeDocument/2006/relationships" type="rect" r:blip="" blipPhldr="1">
@@ -5077,7 +5163,7 @@
           <dgm:constrLst/>
           <dgm:ruleLst/>
         </dgm:layoutNode>
-        <dgm:layoutNode name="iconSpace">
+        <dgm:layoutNode name="spaceRect">
           <dgm:alg type="sp"/>
           <dgm:shape xmlns:r="http://schemas.openxmlformats.org/officeDocument/2006/relationships" r:blip="">
             <dgm:adjLst/>
@@ -5092,56 +5178,60 @@
             <dgm:chPref val="0"/>
           </dgm:varLst>
           <dgm:alg type="tx">
-            <dgm:param type="txAnchorVert" val="t"/>
+            <dgm:param type="txAnchorVert" val="mid"/>
+            <dgm:param type="parTxLTRAlign" val="l"/>
+            <dgm:param type="shpTxLTRAlignCh" val="l"/>
+            <dgm:param type="parTxRTLAlign" val="r"/>
+            <dgm:param type="shpTxRTLAlignCh" val="r"/>
           </dgm:alg>
           <dgm:shape xmlns:r="http://schemas.openxmlformats.org/officeDocument/2006/relationships" type="rect" r:blip="">
             <dgm:adjLst/>
           </dgm:shape>
           <dgm:presOf axis="self" ptType="node"/>
           <dgm:constrLst>
-            <dgm:constr type="lMarg"/>
-            <dgm:constr type="rMarg"/>
-            <dgm:constr type="tMarg"/>
-            <dgm:constr type="bMarg"/>
+            <dgm:constr type="lMarg" refType="h" fact="0.3"/>
+            <dgm:constr type="rMarg" refType="h" fact="0.3"/>
+            <dgm:constr type="tMarg" refType="h" fact="0.3"/>
+            <dgm:constr type="bMarg" refType="h" fact="0.3"/>
           </dgm:constrLst>
           <dgm:ruleLst>
             <dgm:rule type="primFontSz" val="14" fact="NaN" max="NaN"/>
             <dgm:rule type="h" val="INF" fact="NaN" max="NaN"/>
           </dgm:ruleLst>
         </dgm:layoutNode>
-        <dgm:layoutNode name="txSpace">
-          <dgm:alg type="sp"/>
-          <dgm:shape xmlns:r="http://schemas.openxmlformats.org/officeDocument/2006/relationships" r:blip="">
-            <dgm:adjLst/>
-          </dgm:shape>
-          <dgm:presOf/>
-          <dgm:constrLst/>
-          <dgm:ruleLst/>
-        </dgm:layoutNode>
-        <dgm:layoutNode name="desTx" styleLbl="revTx">
-          <dgm:varLst/>
-          <dgm:alg type="tx">
-            <dgm:param type="stBulletLvl" val="0"/>
-            <dgm:param type="txAnchorVert" val="t"/>
-          </dgm:alg>
-          <dgm:shape xmlns:r="http://schemas.openxmlformats.org/officeDocument/2006/relationships" type="rect" r:blip="">
-            <dgm:adjLst/>
-          </dgm:shape>
-          <dgm:presOf axis="des" ptType="node"/>
-          <dgm:constrLst>
-            <dgm:constr type="secFontSz" refType="primFontSz"/>
-            <dgm:constr type="lMarg"/>
-            <dgm:constr type="rMarg"/>
-            <dgm:constr type="tMarg"/>
-            <dgm:constr type="bMarg"/>
-          </dgm:constrLst>
-          <dgm:ruleLst>
-            <dgm:rule type="primFontSz" val="NaN" fact="NaN" max="17"/>
-            <dgm:rule type="h" val="INF" fact="NaN" max="NaN"/>
-          </dgm:ruleLst>
-        </dgm:layoutNode>
+        <dgm:choose name="Name12">
+          <dgm:if name="Name13" axis="ch" ptType="node" func="cnt" op="gte" val="1">
+            <dgm:layoutNode name="desTx" styleLbl="revTx">
+              <dgm:varLst/>
+              <dgm:alg type="tx">
+                <dgm:param type="txAnchorVertCh" val="mid"/>
+                <dgm:param type="parTxLTRAlign" val="l"/>
+                <dgm:param type="shpTxLTRAlignCh" val="l"/>
+                <dgm:param type="parTxRTLAlign" val="r"/>
+                <dgm:param type="shpTxRTLAlignCh" val="r"/>
+                <dgm:param type="stBulletLvl" val="0"/>
+              </dgm:alg>
+              <dgm:shape xmlns:r="http://schemas.openxmlformats.org/officeDocument/2006/relationships" type="rect" r:blip="">
+                <dgm:adjLst/>
+              </dgm:shape>
+              <dgm:presOf axis="des" ptType="node"/>
+              <dgm:constrLst>
+                <dgm:constr type="primFontSz" val="18"/>
+                <dgm:constr type="secFontSz" refType="primFontSz"/>
+                <dgm:constr type="lMarg" refType="h" fact="0.3"/>
+                <dgm:constr type="rMarg" refType="h" fact="0.3"/>
+                <dgm:constr type="tMarg" refType="h" fact="0.3"/>
+                <dgm:constr type="bMarg" refType="h" fact="0.3"/>
+              </dgm:constrLst>
+              <dgm:ruleLst>
+                <dgm:rule type="primFontSz" val="11" fact="NaN" max="NaN"/>
+              </dgm:ruleLst>
+            </dgm:layoutNode>
+          </dgm:if>
+          <dgm:else name="Name14"/>
+        </dgm:choose>
       </dgm:layoutNode>
-      <dgm:forEach name="Name4" axis="followSib" ptType="sibTrans" cnt="1">
+      <dgm:forEach name="Name15" axis="followSib" ptType="sibTrans" cnt="1">
         <dgm:layoutNode name="sibTrans">
           <dgm:alg type="sp"/>
           <dgm:shape xmlns:r="http://schemas.openxmlformats.org/officeDocument/2006/relationships" r:blip="">
@@ -5161,7 +5251,6 @@
           <a:lnSpc>
             <a:spcPct val="100000"/>
           </a:lnSpc>
-          <a:defRPr b="1"/>
         </a:lvl1pPr>
         <a:lvl2pPr>
           <a:lnSpc>
@@ -7411,7 +7500,7 @@
           <a:p>
             <a:fld id="{80BFBE89-80FE-468D-97D6-A60C933E617A}" type="datetimeFigureOut">
               <a:rPr lang="en-US" smtClean="0"/>
-              <a:t>10/29/24</a:t>
+              <a:t>11/7/2024</a:t>
             </a:fld>
             <a:endParaRPr lang="en-US"/>
           </a:p>
@@ -7741,7 +7830,7 @@
           <a:p>
             <a:fld id="{80BFBE89-80FE-468D-97D6-A60C933E617A}" type="datetimeFigureOut">
               <a:rPr lang="en-US" smtClean="0"/>
-              <a:t>10/29/24</a:t>
+              <a:t>11/7/2024</a:t>
             </a:fld>
             <a:endParaRPr lang="en-US"/>
           </a:p>
@@ -7921,7 +8010,7 @@
           <a:p>
             <a:fld id="{80BFBE89-80FE-468D-97D6-A60C933E617A}" type="datetimeFigureOut">
               <a:rPr lang="en-US" smtClean="0"/>
-              <a:t>10/29/24</a:t>
+              <a:t>11/7/2024</a:t>
             </a:fld>
             <a:endParaRPr lang="en-US"/>
           </a:p>
@@ -8091,7 +8180,7 @@
           <a:p>
             <a:fld id="{80BFBE89-80FE-468D-97D6-A60C933E617A}" type="datetimeFigureOut">
               <a:rPr lang="en-US" smtClean="0"/>
-              <a:t>10/29/24</a:t>
+              <a:t>11/7/2024</a:t>
             </a:fld>
             <a:endParaRPr lang="en-US"/>
           </a:p>
@@ -8368,7 +8457,7 @@
           <a:p>
             <a:fld id="{80BFBE89-80FE-468D-97D6-A60C933E617A}" type="datetimeFigureOut">
               <a:rPr lang="en-US" smtClean="0"/>
-              <a:t>10/29/24</a:t>
+              <a:t>11/7/2024</a:t>
             </a:fld>
             <a:endParaRPr lang="en-US"/>
           </a:p>
@@ -8762,7 +8851,7 @@
           <a:p>
             <a:fld id="{80BFBE89-80FE-468D-97D6-A60C933E617A}" type="datetimeFigureOut">
               <a:rPr lang="en-US" smtClean="0"/>
-              <a:t>10/29/24</a:t>
+              <a:t>11/7/2024</a:t>
             </a:fld>
             <a:endParaRPr lang="en-US"/>
           </a:p>
@@ -9239,7 +9328,7 @@
           <a:p>
             <a:fld id="{80BFBE89-80FE-468D-97D6-A60C933E617A}" type="datetimeFigureOut">
               <a:rPr lang="en-US" smtClean="0"/>
-              <a:t>10/29/24</a:t>
+              <a:t>11/7/2024</a:t>
             </a:fld>
             <a:endParaRPr lang="en-US"/>
           </a:p>
@@ -9357,7 +9446,7 @@
           <a:p>
             <a:fld id="{80BFBE89-80FE-468D-97D6-A60C933E617A}" type="datetimeFigureOut">
               <a:rPr lang="en-US" smtClean="0"/>
-              <a:t>10/29/24</a:t>
+              <a:t>11/7/2024</a:t>
             </a:fld>
             <a:endParaRPr lang="en-US"/>
           </a:p>
@@ -9452,7 +9541,7 @@
           <a:p>
             <a:fld id="{80BFBE89-80FE-468D-97D6-A60C933E617A}" type="datetimeFigureOut">
               <a:rPr lang="en-US" smtClean="0"/>
-              <a:t>10/29/24</a:t>
+              <a:t>11/7/2024</a:t>
             </a:fld>
             <a:endParaRPr lang="en-US"/>
           </a:p>
@@ -9798,7 +9887,7 @@
           <a:p>
             <a:fld id="{80BFBE89-80FE-468D-97D6-A60C933E617A}" type="datetimeFigureOut">
               <a:rPr lang="en-US" smtClean="0"/>
-              <a:t>10/29/24</a:t>
+              <a:t>11/7/2024</a:t>
             </a:fld>
             <a:endParaRPr lang="en-US"/>
           </a:p>
@@ -10186,7 +10275,7 @@
           <a:p>
             <a:fld id="{80BFBE89-80FE-468D-97D6-A60C933E617A}" type="datetimeFigureOut">
               <a:rPr lang="en-US" smtClean="0"/>
-              <a:t>10/29/24</a:t>
+              <a:t>11/7/2024</a:t>
             </a:fld>
             <a:endParaRPr lang="en-US"/>
           </a:p>
@@ -10464,7 +10553,7 @@
           <a:p>
             <a:fld id="{80BFBE89-80FE-468D-97D6-A60C933E617A}" type="datetimeFigureOut">
               <a:rPr lang="en-US" smtClean="0"/>
-              <a:t>10/29/24</a:t>
+              <a:t>11/7/2024</a:t>
             </a:fld>
             <a:endParaRPr lang="en-US"/>
           </a:p>
@@ -12157,10 +12246,290 @@
       </p:grpSpPr>
       <p:sp>
         <p:nvSpPr>
-          <p:cNvPr id="9" name="Rectangle 8">
+          <p:cNvPr id="2" name="Title 1">
             <a:extLst>
               <a:ext uri="{FF2B5EF4-FFF2-40B4-BE49-F238E27FC236}">
-                <a16:creationId xmlns:a16="http://schemas.microsoft.com/office/drawing/2014/main" id="{9A204626-2220-4678-A939-FD94EA7B5362}"/>
+                <a16:creationId xmlns:a16="http://schemas.microsoft.com/office/drawing/2014/main" id="{268E8AB0-117F-8D93-7966-61C873C08D57}"/>
+              </a:ext>
+            </a:extLst>
+          </p:cNvPr>
+          <p:cNvSpPr>
+            <a:spLocks noGrp="1"/>
+          </p:cNvSpPr>
+          <p:nvPr>
+            <p:ph type="title"/>
+          </p:nvPr>
+        </p:nvSpPr>
+        <p:spPr>
+          <a:xfrm>
+            <a:off x="6389914" y="685800"/>
+            <a:ext cx="5127172" cy="1485900"/>
+          </a:xfrm>
+        </p:spPr>
+        <p:txBody>
+          <a:bodyPr>
+            <a:normAutofit/>
+          </a:bodyPr>
+          <a:lstStyle/>
+          <a:p>
+            <a:r>
+              <a:rPr lang="en-US" dirty="0"/>
+              <a:t>Provisioner Examples</a:t>
+            </a:r>
+          </a:p>
+        </p:txBody>
+      </p:sp>
+      <p:sp>
+        <p:nvSpPr>
+          <p:cNvPr id="16" name="Rectangle 15">
+            <a:extLst>
+              <a:ext uri="{FF2B5EF4-FFF2-40B4-BE49-F238E27FC236}">
+                <a16:creationId xmlns:a16="http://schemas.microsoft.com/office/drawing/2014/main" id="{A67E2D8A-19BE-48A0-889C-CCAC02348C99}"/>
+              </a:ext>
+              <a:ext uri="{C183D7F6-B498-43B3-948B-1728B52AA6E4}">
+                <adec:decorative xmlns:adec="http://schemas.microsoft.com/office/drawing/2017/decorative" val="1"/>
+              </a:ext>
+            </a:extLst>
+          </p:cNvPr>
+          <p:cNvSpPr>
+            <a:spLocks noGrp="1" noRot="1" noChangeAspect="1" noMove="1" noResize="1" noEditPoints="1" noAdjustHandles="1" noChangeArrowheads="1" noChangeShapeType="1" noTextEdit="1"/>
+          </p:cNvSpPr>
+          <p:nvPr>
+            <p:extLst>
+              <p:ext uri="{386F3935-93C4-4BCD-93E2-E3B085C9AB24}">
+                <p16:designElem xmlns:p16="http://schemas.microsoft.com/office/powerpoint/2015/main" val="1"/>
+              </p:ext>
+            </p:extLst>
+          </p:nvPr>
+        </p:nvSpPr>
+        <p:spPr>
+          <a:xfrm>
+            <a:off x="478095" y="376"/>
+            <a:ext cx="228600" cy="6858000"/>
+          </a:xfrm>
+          <a:prstGeom prst="rect">
+            <a:avLst/>
+          </a:prstGeom>
+          <a:solidFill>
+            <a:schemeClr val="tx2"/>
+          </a:solidFill>
+          <a:ln>
+            <a:noFill/>
+          </a:ln>
+        </p:spPr>
+        <p:style>
+          <a:lnRef idx="2">
+            <a:schemeClr val="accent1">
+              <a:shade val="50000"/>
+            </a:schemeClr>
+          </a:lnRef>
+          <a:fillRef idx="1">
+            <a:schemeClr val="accent1"/>
+          </a:fillRef>
+          <a:effectRef idx="0">
+            <a:schemeClr val="accent1"/>
+          </a:effectRef>
+          <a:fontRef idx="minor">
+            <a:schemeClr val="lt1"/>
+          </a:fontRef>
+        </p:style>
+        <p:txBody>
+          <a:bodyPr/>
+          <a:lstStyle/>
+          <a:p>
+            <a:endParaRPr lang="en-US"/>
+          </a:p>
+        </p:txBody>
+      </p:sp>
+      <p:pic>
+        <p:nvPicPr>
+          <p:cNvPr id="4" name="Graphic 3" descr="Programmer">
+            <a:extLst>
+              <a:ext uri="{FF2B5EF4-FFF2-40B4-BE49-F238E27FC236}">
+                <a16:creationId xmlns:a16="http://schemas.microsoft.com/office/drawing/2014/main" id="{074C34D7-4F05-91CC-F830-151DEE729F2F}"/>
+              </a:ext>
+            </a:extLst>
+          </p:cNvPr>
+          <p:cNvPicPr>
+            <a:picLocks noChangeAspect="1"/>
+          </p:cNvPicPr>
+          <p:nvPr/>
+        </p:nvPicPr>
+        <p:blipFill>
+          <a:blip r:embed="rId2">
+            <a:extLst>
+              <a:ext uri="{28A0092B-C50C-407E-A947-70E740481C1C}">
+                <a14:useLocalDpi xmlns:a14="http://schemas.microsoft.com/office/drawing/2010/main" val="0"/>
+              </a:ext>
+              <a:ext uri="{96DAC541-7B7A-43D3-8B79-37D633B846F1}">
+                <asvg:svgBlip xmlns:asvg="http://schemas.microsoft.com/office/drawing/2016/SVG/main" r:embed="rId3"/>
+              </a:ext>
+            </a:extLst>
+          </a:blip>
+          <a:stretch>
+            <a:fillRect/>
+          </a:stretch>
+        </p:blipFill>
+        <p:spPr>
+          <a:xfrm>
+            <a:off x="1602060" y="145522"/>
+            <a:ext cx="3581400" cy="3581400"/>
+          </a:xfrm>
+          <a:prstGeom prst="rect">
+            <a:avLst/>
+          </a:prstGeom>
+        </p:spPr>
+      </p:pic>
+      <p:sp>
+        <p:nvSpPr>
+          <p:cNvPr id="3" name="Content Placeholder 2">
+            <a:extLst>
+              <a:ext uri="{FF2B5EF4-FFF2-40B4-BE49-F238E27FC236}">
+                <a16:creationId xmlns:a16="http://schemas.microsoft.com/office/drawing/2014/main" id="{5A7ADB1F-B1B6-1F32-9C20-59248B3CDF00}"/>
+              </a:ext>
+            </a:extLst>
+          </p:cNvPr>
+          <p:cNvSpPr>
+            <a:spLocks noGrp="1"/>
+          </p:cNvSpPr>
+          <p:nvPr>
+            <p:ph idx="1"/>
+          </p:nvPr>
+        </p:nvSpPr>
+        <p:spPr>
+          <a:xfrm>
+            <a:off x="1982755" y="3726922"/>
+            <a:ext cx="9594980" cy="2804507"/>
+          </a:xfrm>
+        </p:spPr>
+        <p:txBody>
+          <a:bodyPr>
+            <a:normAutofit/>
+          </a:bodyPr>
+          <a:lstStyle/>
+          <a:p>
+            <a:pPr marL="0" indent="0">
+              <a:buNone/>
+            </a:pPr>
+            <a:r>
+              <a:rPr lang="en-US" b="1" dirty="0"/>
+              <a:t>Local Exec Provisioner:</a:t>
+            </a:r>
+          </a:p>
+          <a:p>
+            <a:pPr marL="0" indent="0">
+              <a:buNone/>
+            </a:pPr>
+            <a:r>
+              <a:rPr lang="en-US" i="1" dirty="0"/>
+              <a:t>Executes a script on the machine running Terraform.</a:t>
+            </a:r>
+          </a:p>
+          <a:p>
+            <a:pPr marL="0" indent="0">
+              <a:buNone/>
+            </a:pPr>
+            <a:endParaRPr lang="en-US" dirty="0">
+              <a:latin typeface="Consolas" panose="020B0609020204030204" pitchFamily="49" charset="0"/>
+              <a:cs typeface="Consolas" panose="020B0609020204030204" pitchFamily="49" charset="0"/>
+            </a:endParaRPr>
+          </a:p>
+          <a:p>
+            <a:pPr marL="0" indent="0">
+              <a:buNone/>
+            </a:pPr>
+            <a:r>
+              <a:rPr lang="en-US" dirty="0">
+                <a:latin typeface="Consolas" panose="020B0609020204030204" pitchFamily="49" charset="0"/>
+                <a:cs typeface="Consolas" panose="020B0609020204030204" pitchFamily="49" charset="0"/>
+              </a:rPr>
+              <a:t>provisioner "local-exec" {</a:t>
+            </a:r>
+          </a:p>
+          <a:p>
+            <a:pPr marL="0" indent="0">
+              <a:buNone/>
+            </a:pPr>
+            <a:r>
+              <a:rPr lang="en-US" dirty="0">
+                <a:latin typeface="Consolas" panose="020B0609020204030204" pitchFamily="49" charset="0"/>
+                <a:cs typeface="Consolas" panose="020B0609020204030204" pitchFamily="49" charset="0"/>
+              </a:rPr>
+              <a:t>  command = "echo 'VM has been provisioned' &gt; /</a:t>
+            </a:r>
+            <a:r>
+              <a:rPr lang="en-US" dirty="0" err="1">
+                <a:latin typeface="Consolas" panose="020B0609020204030204" pitchFamily="49" charset="0"/>
+                <a:cs typeface="Consolas" panose="020B0609020204030204" pitchFamily="49" charset="0"/>
+              </a:rPr>
+              <a:t>tmp</a:t>
+            </a:r>
+            <a:r>
+              <a:rPr lang="en-US" dirty="0">
+                <a:latin typeface="Consolas" panose="020B0609020204030204" pitchFamily="49" charset="0"/>
+                <a:cs typeface="Consolas" panose="020B0609020204030204" pitchFamily="49" charset="0"/>
+              </a:rPr>
+              <a:t>/provision.log"</a:t>
+            </a:r>
+          </a:p>
+          <a:p>
+            <a:pPr marL="0" indent="0">
+              <a:buNone/>
+            </a:pPr>
+            <a:r>
+              <a:rPr lang="en-US" dirty="0">
+                <a:latin typeface="Consolas" panose="020B0609020204030204" pitchFamily="49" charset="0"/>
+                <a:cs typeface="Consolas" panose="020B0609020204030204" pitchFamily="49" charset="0"/>
+              </a:rPr>
+              <a:t>}</a:t>
+            </a:r>
+          </a:p>
+        </p:txBody>
+      </p:sp>
+    </p:spTree>
+    <p:extLst>
+      <p:ext uri="{BB962C8B-B14F-4D97-AF65-F5344CB8AC3E}">
+        <p14:creationId xmlns:p14="http://schemas.microsoft.com/office/powerpoint/2010/main" val="880193064"/>
+      </p:ext>
+    </p:extLst>
+  </p:cSld>
+  <p:clrMapOvr>
+    <a:masterClrMapping/>
+  </p:clrMapOvr>
+</p:sld>
+</file>
+
+<file path=ppt/slides/slide5.xml><?xml version="1.0" encoding="utf-8"?>
+<p:sld xmlns:a="http://schemas.openxmlformats.org/drawingml/2006/main" xmlns:r="http://schemas.openxmlformats.org/officeDocument/2006/relationships" xmlns:p="http://schemas.openxmlformats.org/presentationml/2006/main">
+  <p:cSld>
+    <p:bg>
+      <p:bgPr>
+        <a:solidFill>
+          <a:schemeClr val="bg1"/>
+        </a:solidFill>
+        <a:effectLst/>
+      </p:bgPr>
+    </p:bg>
+    <p:spTree>
+      <p:nvGrpSpPr>
+        <p:cNvPr id="1" name=""/>
+        <p:cNvGrpSpPr/>
+        <p:nvPr/>
+      </p:nvGrpSpPr>
+      <p:grpSpPr>
+        <a:xfrm>
+          <a:off x="0" y="0"/>
+          <a:ext cx="0" cy="0"/>
+          <a:chOff x="0" y="0"/>
+          <a:chExt cx="0" cy="0"/>
+        </a:xfrm>
+      </p:grpSpPr>
+      <p:sp>
+        <p:nvSpPr>
+          <p:cNvPr id="11" name="Rectangle 10">
+            <a:extLst>
+              <a:ext uri="{FF2B5EF4-FFF2-40B4-BE49-F238E27FC236}">
+                <a16:creationId xmlns:a16="http://schemas.microsoft.com/office/drawing/2014/main" id="{62DAC179-C790-4427-B1A0-AF7E55B8E6FA}"/>
               </a:ext>
               <a:ext uri="{C183D7F6-B498-43B3-948B-1728B52AA6E4}">
                 <adec:decorative xmlns:adec="http://schemas.microsoft.com/office/drawing/2017/decorative" val="1"/>
@@ -12223,7 +12592,7 @@
           <p:cNvPr id="2" name="Title 1">
             <a:extLst>
               <a:ext uri="{FF2B5EF4-FFF2-40B4-BE49-F238E27FC236}">
-                <a16:creationId xmlns:a16="http://schemas.microsoft.com/office/drawing/2014/main" id="{268E8AB0-117F-8D93-7966-61C873C08D57}"/>
+                <a16:creationId xmlns:a16="http://schemas.microsoft.com/office/drawing/2014/main" id="{C58255ED-BBBB-7834-1FCE-036B2F29A068}"/>
               </a:ext>
             </a:extLst>
           </p:cNvPr>
@@ -12236,149 +12605,89 @@
         </p:nvSpPr>
         <p:spPr>
           <a:xfrm>
-            <a:off x="428017" y="685800"/>
-            <a:ext cx="6315563" cy="1485900"/>
+            <a:off x="8252340" y="639704"/>
+            <a:ext cx="3299579" cy="5577840"/>
           </a:xfrm>
         </p:spPr>
         <p:txBody>
-          <a:bodyPr>
+          <a:bodyPr anchor="ctr">
             <a:normAutofit/>
           </a:bodyPr>
           <a:lstStyle/>
           <a:p>
             <a:r>
               <a:rPr lang="en-US" dirty="0"/>
-              <a:t>Provisioner Examples</a:t>
-            </a:r>
+              <a:t>Using Terraform Functions</a:t>
+            </a:r>
+          </a:p>
+        </p:txBody>
+      </p:sp>
+      <p:sp useBgFill="1">
+        <p:nvSpPr>
+          <p:cNvPr id="13" name="Rectangle 12">
+            <a:extLst>
+              <a:ext uri="{FF2B5EF4-FFF2-40B4-BE49-F238E27FC236}">
+                <a16:creationId xmlns:a16="http://schemas.microsoft.com/office/drawing/2014/main" id="{EA392D87-3787-45D6-976E-B85674C09048}"/>
+              </a:ext>
+              <a:ext uri="{C183D7F6-B498-43B3-948B-1728B52AA6E4}">
+                <adec:decorative xmlns:adec="http://schemas.microsoft.com/office/drawing/2017/decorative" val="1"/>
+              </a:ext>
+            </a:extLst>
+          </p:cNvPr>
+          <p:cNvSpPr>
+            <a:spLocks noGrp="1" noRot="1" noChangeAspect="1" noMove="1" noResize="1" noEditPoints="1" noAdjustHandles="1" noChangeArrowheads="1" noChangeShapeType="1" noTextEdit="1"/>
+          </p:cNvSpPr>
+          <p:nvPr>
+            <p:extLst>
+              <p:ext uri="{386F3935-93C4-4BCD-93E2-E3B085C9AB24}">
+                <p16:designElem xmlns:p16="http://schemas.microsoft.com/office/powerpoint/2015/main" val="1"/>
+              </p:ext>
+            </p:extLst>
+          </p:nvPr>
+        </p:nvSpPr>
+        <p:spPr>
+          <a:xfrm>
+            <a:off x="0" y="0"/>
+            <a:ext cx="7383661" cy="6858000"/>
+          </a:xfrm>
+          <a:prstGeom prst="rect">
+            <a:avLst/>
+          </a:prstGeom>
+          <a:ln>
+            <a:noFill/>
+          </a:ln>
+        </p:spPr>
+        <p:style>
+          <a:lnRef idx="2">
+            <a:schemeClr val="accent1">
+              <a:shade val="50000"/>
+            </a:schemeClr>
+          </a:lnRef>
+          <a:fillRef idx="1">
+            <a:schemeClr val="accent1"/>
+          </a:fillRef>
+          <a:effectRef idx="0">
+            <a:schemeClr val="accent1"/>
+          </a:effectRef>
+          <a:fontRef idx="minor">
+            <a:schemeClr val="lt1"/>
+          </a:fontRef>
+        </p:style>
+        <p:txBody>
+          <a:bodyPr rtlCol="0" anchor="ctr"/>
+          <a:lstStyle/>
+          <a:p>
+            <a:pPr algn="ctr"/>
+            <a:endParaRPr lang="en-US"/>
           </a:p>
         </p:txBody>
       </p:sp>
       <p:sp>
         <p:nvSpPr>
-          <p:cNvPr id="3" name="Content Placeholder 2">
+          <p:cNvPr id="15" name="Rectangle 14">
             <a:extLst>
               <a:ext uri="{FF2B5EF4-FFF2-40B4-BE49-F238E27FC236}">
-                <a16:creationId xmlns:a16="http://schemas.microsoft.com/office/drawing/2014/main" id="{5A7ADB1F-B1B6-1F32-9C20-59248B3CDF00}"/>
-              </a:ext>
-            </a:extLst>
-          </p:cNvPr>
-          <p:cNvSpPr>
-            <a:spLocks noGrp="1"/>
-          </p:cNvSpPr>
-          <p:nvPr>
-            <p:ph idx="1"/>
-          </p:nvPr>
-        </p:nvSpPr>
-        <p:spPr>
-          <a:xfrm>
-            <a:off x="428017" y="1530485"/>
-            <a:ext cx="6738026" cy="4336915"/>
-          </a:xfrm>
-        </p:spPr>
-        <p:txBody>
-          <a:bodyPr>
-            <a:normAutofit/>
-          </a:bodyPr>
-          <a:lstStyle/>
-          <a:p>
-            <a:pPr marL="0" indent="0">
-              <a:buNone/>
-            </a:pPr>
-            <a:r>
-              <a:rPr lang="en-US" b="1" dirty="0"/>
-              <a:t>Local Exec Provisioner:</a:t>
-            </a:r>
-          </a:p>
-          <a:p>
-            <a:pPr marL="0" indent="0">
-              <a:buNone/>
-            </a:pPr>
-            <a:r>
-              <a:rPr lang="en-US" i="1" dirty="0"/>
-              <a:t>Executes a script on the machine running Terraform.</a:t>
-            </a:r>
-          </a:p>
-          <a:p>
-            <a:pPr marL="0" indent="0">
-              <a:buNone/>
-            </a:pPr>
-            <a:endParaRPr lang="en-US" sz="2400" dirty="0">
-              <a:latin typeface="Consolas" panose="020B0609020204030204" pitchFamily="49" charset="0"/>
-              <a:cs typeface="Consolas" panose="020B0609020204030204" pitchFamily="49" charset="0"/>
-            </a:endParaRPr>
-          </a:p>
-          <a:p>
-            <a:pPr marL="0" indent="0">
-              <a:buNone/>
-            </a:pPr>
-            <a:r>
-              <a:rPr lang="en-US" sz="2400" dirty="0">
-                <a:latin typeface="Consolas" panose="020B0609020204030204" pitchFamily="49" charset="0"/>
-                <a:cs typeface="Consolas" panose="020B0609020204030204" pitchFamily="49" charset="0"/>
-              </a:rPr>
-              <a:t>provisioner "local-exec" {</a:t>
-            </a:r>
-          </a:p>
-          <a:p>
-            <a:pPr marL="0" indent="0">
-              <a:buNone/>
-            </a:pPr>
-            <a:r>
-              <a:rPr lang="en-US" sz="2400" dirty="0">
-                <a:latin typeface="Consolas" panose="020B0609020204030204" pitchFamily="49" charset="0"/>
-                <a:cs typeface="Consolas" panose="020B0609020204030204" pitchFamily="49" charset="0"/>
-              </a:rPr>
-              <a:t>  command = "echo 'VM has been provisioned' &gt; /</a:t>
-            </a:r>
-            <a:r>
-              <a:rPr lang="en-US" sz="2400" dirty="0" err="1">
-                <a:latin typeface="Consolas" panose="020B0609020204030204" pitchFamily="49" charset="0"/>
-                <a:cs typeface="Consolas" panose="020B0609020204030204" pitchFamily="49" charset="0"/>
-              </a:rPr>
-              <a:t>tmp</a:t>
-            </a:r>
-            <a:r>
-              <a:rPr lang="en-US" sz="2400" dirty="0">
-                <a:latin typeface="Consolas" panose="020B0609020204030204" pitchFamily="49" charset="0"/>
-                <a:cs typeface="Consolas" panose="020B0609020204030204" pitchFamily="49" charset="0"/>
-              </a:rPr>
-              <a:t>/</a:t>
-            </a:r>
-            <a:r>
-              <a:rPr lang="en-US" sz="2400" dirty="0" err="1">
-                <a:latin typeface="Consolas" panose="020B0609020204030204" pitchFamily="49" charset="0"/>
-                <a:cs typeface="Consolas" panose="020B0609020204030204" pitchFamily="49" charset="0"/>
-              </a:rPr>
-              <a:t>provision.log</a:t>
-            </a:r>
-            <a:r>
-              <a:rPr lang="en-US" sz="2400" dirty="0">
-                <a:latin typeface="Consolas" panose="020B0609020204030204" pitchFamily="49" charset="0"/>
-                <a:cs typeface="Consolas" panose="020B0609020204030204" pitchFamily="49" charset="0"/>
-              </a:rPr>
-              <a:t>"</a:t>
-            </a:r>
-          </a:p>
-          <a:p>
-            <a:pPr marL="0" indent="0">
-              <a:buNone/>
-            </a:pPr>
-            <a:r>
-              <a:rPr lang="en-US" sz="2400" dirty="0">
-                <a:latin typeface="Consolas" panose="020B0609020204030204" pitchFamily="49" charset="0"/>
-                <a:cs typeface="Consolas" panose="020B0609020204030204" pitchFamily="49" charset="0"/>
-              </a:rPr>
-              <a:t>}</a:t>
-            </a:r>
-          </a:p>
-        </p:txBody>
-      </p:sp>
-      <p:sp>
-        <p:nvSpPr>
-          <p:cNvPr id="11" name="Rectangle 10">
-            <a:extLst>
-              <a:ext uri="{FF2B5EF4-FFF2-40B4-BE49-F238E27FC236}">
-                <a16:creationId xmlns:a16="http://schemas.microsoft.com/office/drawing/2014/main" id="{EB97D8A6-1C5A-42B6-AE78-F3D0F9BDF024}"/>
+                <a16:creationId xmlns:a16="http://schemas.microsoft.com/office/drawing/2014/main" id="{DEFE8E04-DEE3-49FD-89A2-285FAD1CB6E0}"/>
               </a:ext>
               <a:ext uri="{C183D7F6-B498-43B3-948B-1728B52AA6E4}">
                 <adec:decorative xmlns:adec="http://schemas.microsoft.com/office/drawing/2017/decorative" val="1"/>
@@ -12405,7 +12714,11 @@
             <a:avLst/>
           </a:prstGeom>
           <a:solidFill>
-            <a:schemeClr val="tx2"/>
+            <a:schemeClr val="tx1">
+              <a:lumMod val="50000"/>
+              <a:lumOff val="50000"/>
+              <a:alpha val="60000"/>
+            </a:schemeClr>
           </a:solidFill>
           <a:ln>
             <a:noFill/>
@@ -12435,100 +12748,69 @@
           </a:p>
         </p:txBody>
       </p:sp>
-      <p:pic>
-        <p:nvPicPr>
-          <p:cNvPr id="4" name="Graphic 3" descr="Programmer">
+      <p:sp>
+        <p:nvSpPr>
+          <p:cNvPr id="6" name="Rectangle 5">
             <a:extLst>
               <a:ext uri="{FF2B5EF4-FFF2-40B4-BE49-F238E27FC236}">
-                <a16:creationId xmlns:a16="http://schemas.microsoft.com/office/drawing/2014/main" id="{074C34D7-4F05-91CC-F830-151DEE729F2F}"/>
+                <a16:creationId xmlns:a16="http://schemas.microsoft.com/office/drawing/2014/main" id="{9BD4C1A9-B726-67DB-F9E6-82C3875C163D}"/>
               </a:ext>
             </a:extLst>
           </p:cNvPr>
-          <p:cNvPicPr>
-            <a:picLocks noChangeAspect="1"/>
-          </p:cNvPicPr>
+          <p:cNvSpPr/>
           <p:nvPr/>
-        </p:nvPicPr>
-        <p:blipFill>
-          <a:blip r:embed="rId2">
-            <a:extLst>
-              <a:ext uri="{28A0092B-C50C-407E-A947-70E740481C1C}">
-                <a14:useLocalDpi xmlns:a14="http://schemas.microsoft.com/office/drawing/2010/main" val="0"/>
-              </a:ext>
-              <a:ext uri="{96DAC541-7B7A-43D3-8B79-37D633B846F1}">
-                <asvg:svgBlip xmlns:asvg="http://schemas.microsoft.com/office/drawing/2016/SVG/main" r:embed="rId3"/>
-              </a:ext>
-            </a:extLst>
-          </a:blip>
-          <a:stretch>
-            <a:fillRect/>
-          </a:stretch>
-        </p:blipFill>
+        </p:nvSpPr>
         <p:spPr>
           <a:xfrm>
-            <a:off x="8252340" y="1778834"/>
-            <a:ext cx="3299579" cy="3299579"/>
+            <a:off x="6867728" y="4056963"/>
+            <a:ext cx="5216866" cy="2801038"/>
           </a:xfrm>
           <a:prstGeom prst="rect">
             <a:avLst/>
           </a:prstGeom>
         </p:spPr>
-      </p:pic>
-    </p:spTree>
-    <p:extLst>
-      <p:ext uri="{BB962C8B-B14F-4D97-AF65-F5344CB8AC3E}">
-        <p14:creationId xmlns:p14="http://schemas.microsoft.com/office/powerpoint/2010/main" val="880193064"/>
-      </p:ext>
-    </p:extLst>
-  </p:cSld>
-  <p:clrMapOvr>
-    <a:masterClrMapping/>
-  </p:clrMapOvr>
-</p:sld>
-</file>
-
-<file path=ppt/slides/slide5.xml><?xml version="1.0" encoding="utf-8"?>
-<p:sld xmlns:a="http://schemas.openxmlformats.org/drawingml/2006/main" xmlns:r="http://schemas.openxmlformats.org/officeDocument/2006/relationships" xmlns:p="http://schemas.openxmlformats.org/presentationml/2006/main">
-  <p:cSld>
-    <p:spTree>
-      <p:nvGrpSpPr>
-        <p:cNvPr id="1" name=""/>
-        <p:cNvGrpSpPr/>
-        <p:nvPr/>
-      </p:nvGrpSpPr>
-      <p:grpSpPr>
-        <a:xfrm>
-          <a:off x="0" y="0"/>
-          <a:ext cx="0" cy="0"/>
-          <a:chOff x="0" y="0"/>
-          <a:chExt cx="0" cy="0"/>
-        </a:xfrm>
-      </p:grpSpPr>
-      <p:sp>
-        <p:nvSpPr>
-          <p:cNvPr id="2" name="Title 1">
-            <a:extLst>
-              <a:ext uri="{FF2B5EF4-FFF2-40B4-BE49-F238E27FC236}">
-                <a16:creationId xmlns:a16="http://schemas.microsoft.com/office/drawing/2014/main" id="{C58255ED-BBBB-7834-1FCE-036B2F29A068}"/>
-              </a:ext>
-            </a:extLst>
-          </p:cNvPr>
-          <p:cNvSpPr>
-            <a:spLocks noGrp="1"/>
-          </p:cNvSpPr>
-          <p:nvPr>
-            <p:ph type="title"/>
-          </p:nvPr>
-        </p:nvSpPr>
-        <p:spPr/>
+        <p:style>
+          <a:lnRef idx="0">
+            <a:schemeClr val="dk1">
+              <a:alpha val="0"/>
+              <a:hueOff val="0"/>
+              <a:satOff val="0"/>
+              <a:lumOff val="0"/>
+              <a:alphaOff val="0"/>
+            </a:schemeClr>
+          </a:lnRef>
+          <a:fillRef idx="0">
+            <a:schemeClr val="lt1">
+              <a:alpha val="0"/>
+              <a:hueOff val="0"/>
+              <a:satOff val="0"/>
+              <a:lumOff val="0"/>
+              <a:alphaOff val="0"/>
+            </a:schemeClr>
+          </a:fillRef>
+          <a:effectRef idx="0">
+            <a:schemeClr val="lt1">
+              <a:alpha val="0"/>
+              <a:hueOff val="0"/>
+              <a:satOff val="0"/>
+              <a:lumOff val="0"/>
+              <a:alphaOff val="0"/>
+            </a:schemeClr>
+          </a:effectRef>
+          <a:fontRef idx="minor">
+            <a:schemeClr val="tx1">
+              <a:hueOff val="0"/>
+              <a:satOff val="0"/>
+              <a:lumOff val="0"/>
+              <a:alphaOff val="0"/>
+            </a:schemeClr>
+          </a:fontRef>
+        </p:style>
         <p:txBody>
           <a:bodyPr/>
           <a:lstStyle/>
           <a:p>
-            <a:r>
-              <a:rPr lang="en-US" dirty="0"/>
-              <a:t>Using Terraform Functions</a:t>
-            </a:r>
+            <a:endParaRPr lang="en-US"/>
           </a:p>
         </p:txBody>
       </p:sp>
@@ -12548,14 +12830,14 @@
             <p:ph idx="1"/>
             <p:extLst>
               <p:ext uri="{D42A27DB-BD31-4B8C-83A1-F6EECF244321}">
-                <p14:modId xmlns:p14="http://schemas.microsoft.com/office/powerpoint/2010/main" val="4084768407"/>
+                <p14:modId xmlns:p14="http://schemas.microsoft.com/office/powerpoint/2010/main" val="723287466"/>
               </p:ext>
             </p:extLst>
           </p:nvPr>
         </p:nvGraphicFramePr>
         <p:xfrm>
-          <a:off x="1371599" y="1435008"/>
-          <a:ext cx="10615717" cy="3480703"/>
+          <a:off x="640081" y="117248"/>
+          <a:ext cx="5959475" cy="3866923"/>
         </p:xfrm>
         <a:graphic>
           <a:graphicData uri="http://schemas.openxmlformats.org/drawingml/2006/diagram">
@@ -12563,479 +12845,392 @@
           </a:graphicData>
         </a:graphic>
       </p:graphicFrame>
-      <p:grpSp>
-        <p:nvGrpSpPr>
-          <p:cNvPr id="4" name="Group 3">
+      <p:sp>
+        <p:nvSpPr>
+          <p:cNvPr id="3" name="TextBox 2">
             <a:extLst>
               <a:ext uri="{FF2B5EF4-FFF2-40B4-BE49-F238E27FC236}">
-                <a16:creationId xmlns:a16="http://schemas.microsoft.com/office/drawing/2014/main" id="{F5AA8CC5-CBED-A169-1C2A-78D846804197}"/>
+                <a16:creationId xmlns:a16="http://schemas.microsoft.com/office/drawing/2014/main" id="{E73B9AC2-8779-F42D-3D6B-0D178D35EF1A}"/>
               </a:ext>
             </a:extLst>
           </p:cNvPr>
-          <p:cNvGrpSpPr/>
+          <p:cNvSpPr txBox="1"/>
           <p:nvPr/>
-        </p:nvGrpSpPr>
-        <p:grpSpPr>
+        </p:nvSpPr>
+        <p:spPr>
           <a:xfrm>
-            <a:off x="6867728" y="3644631"/>
-            <a:ext cx="5216866" cy="3213370"/>
-            <a:chOff x="5665856" y="2013653"/>
-            <a:chExt cx="4320000" cy="2614273"/>
+            <a:off x="640080" y="3428623"/>
+            <a:ext cx="7454226" cy="3504021"/>
           </a:xfrm>
-        </p:grpSpPr>
-        <p:sp>
-          <p:nvSpPr>
-            <p:cNvPr id="6" name="Rectangle 5">
-              <a:extLst>
-                <a:ext uri="{FF2B5EF4-FFF2-40B4-BE49-F238E27FC236}">
-                  <a16:creationId xmlns:a16="http://schemas.microsoft.com/office/drawing/2014/main" id="{9BD4C1A9-B726-67DB-F9E6-82C3875C163D}"/>
-                </a:ext>
-              </a:extLst>
-            </p:cNvPr>
-            <p:cNvSpPr/>
-            <p:nvPr/>
-          </p:nvSpPr>
-          <p:spPr>
-            <a:xfrm>
-              <a:off x="5665856" y="2349110"/>
-              <a:ext cx="4320000" cy="2278816"/>
-            </a:xfrm>
-            <a:prstGeom prst="rect">
-              <a:avLst/>
-            </a:prstGeom>
-          </p:spPr>
-          <p:style>
-            <a:lnRef idx="0">
-              <a:schemeClr val="dk1">
-                <a:alpha val="0"/>
-                <a:hueOff val="0"/>
-                <a:satOff val="0"/>
-                <a:lumOff val="0"/>
-                <a:alphaOff val="0"/>
-              </a:schemeClr>
-            </a:lnRef>
-            <a:fillRef idx="0">
-              <a:schemeClr val="lt1">
-                <a:alpha val="0"/>
-                <a:hueOff val="0"/>
-                <a:satOff val="0"/>
-                <a:lumOff val="0"/>
-                <a:alphaOff val="0"/>
-              </a:schemeClr>
-            </a:fillRef>
-            <a:effectRef idx="0">
-              <a:schemeClr val="lt1">
-                <a:alpha val="0"/>
-                <a:hueOff val="0"/>
-                <a:satOff val="0"/>
-                <a:lumOff val="0"/>
-                <a:alphaOff val="0"/>
-              </a:schemeClr>
-            </a:effectRef>
-            <a:fontRef idx="minor">
-              <a:schemeClr val="tx1">
-                <a:hueOff val="0"/>
-                <a:satOff val="0"/>
-                <a:lumOff val="0"/>
-                <a:alphaOff val="0"/>
-              </a:schemeClr>
-            </a:fontRef>
-          </p:style>
-          <p:txBody>
-            <a:bodyPr/>
-            <a:lstStyle/>
-            <a:p>
-              <a:endParaRPr lang="en-US"/>
-            </a:p>
-          </p:txBody>
-        </p:sp>
-        <p:sp>
-          <p:nvSpPr>
-            <p:cNvPr id="7" name="TextBox 6">
-              <a:extLst>
-                <a:ext uri="{FF2B5EF4-FFF2-40B4-BE49-F238E27FC236}">
-                  <a16:creationId xmlns:a16="http://schemas.microsoft.com/office/drawing/2014/main" id="{E73B9AC2-8779-F42D-3D6B-0D178D35EF1A}"/>
-                </a:ext>
-              </a:extLst>
-            </p:cNvPr>
-            <p:cNvSpPr txBox="1"/>
-            <p:nvPr/>
-          </p:nvSpPr>
-          <p:spPr>
-            <a:xfrm>
-              <a:off x="5665856" y="2013653"/>
-              <a:ext cx="4320000" cy="2614273"/>
-            </a:xfrm>
-            <a:prstGeom prst="rect">
-              <a:avLst/>
-            </a:prstGeom>
-          </p:spPr>
-          <p:style>
-            <a:lnRef idx="0">
-              <a:scrgbClr r="0" g="0" b="0"/>
-            </a:lnRef>
-            <a:fillRef idx="0">
-              <a:scrgbClr r="0" g="0" b="0"/>
-            </a:fillRef>
-            <a:effectRef idx="0">
-              <a:scrgbClr r="0" g="0" b="0"/>
-            </a:effectRef>
-            <a:fontRef idx="minor">
-              <a:schemeClr val="tx1">
-                <a:hueOff val="0"/>
-                <a:satOff val="0"/>
-                <a:lumOff val="0"/>
-                <a:alphaOff val="0"/>
-              </a:schemeClr>
-            </a:fontRef>
-          </p:style>
-          <p:txBody>
-            <a:bodyPr spcFirstLastPara="0" vert="horz" wrap="square" lIns="0" tIns="0" rIns="0" bIns="0" numCol="1" spcCol="1270" anchor="t" anchorCtr="0">
-              <a:noAutofit/>
-            </a:bodyPr>
-            <a:lstStyle/>
-            <a:p>
-              <a:pPr marL="0" lvl="0" indent="0" algn="l" defTabSz="488950">
-                <a:lnSpc>
-                  <a:spcPct val="100000"/>
-                </a:lnSpc>
-                <a:spcBef>
-                  <a:spcPct val="0"/>
-                </a:spcBef>
-                <a:spcAft>
-                  <a:spcPct val="35000"/>
-                </a:spcAft>
-                <a:buNone/>
-              </a:pPr>
-              <a:r>
-                <a:rPr lang="en-US" sz="1400" i="1" kern="1200" baseline="0" dirty="0"/>
-                <a:t>join(): Combines list elements into a single string.</a:t>
-              </a:r>
-              <a:endParaRPr lang="en-US" sz="1400" kern="1200" dirty="0"/>
-            </a:p>
-            <a:p>
-              <a:pPr marL="57150" lvl="1" indent="-57150" algn="l" defTabSz="488950">
-                <a:lnSpc>
-                  <a:spcPct val="90000"/>
-                </a:lnSpc>
-                <a:spcBef>
-                  <a:spcPct val="0"/>
-                </a:spcBef>
-                <a:spcAft>
-                  <a:spcPct val="15000"/>
-                </a:spcAft>
-                <a:buNone/>
-              </a:pPr>
-              <a:r>
-                <a:rPr lang="en-US" sz="1400" kern="1200" baseline="0" dirty="0">
-                  <a:latin typeface="Consolas" panose="020B0609020204030204" pitchFamily="49" charset="0"/>
-                  <a:cs typeface="Consolas" panose="020B0609020204030204" pitchFamily="49" charset="0"/>
-                </a:rPr>
-                <a:t>output "</a:t>
-              </a:r>
-              <a:r>
-                <a:rPr lang="en-US" sz="1400" kern="1200" baseline="0" dirty="0" err="1">
-                  <a:latin typeface="Consolas" panose="020B0609020204030204" pitchFamily="49" charset="0"/>
-                  <a:cs typeface="Consolas" panose="020B0609020204030204" pitchFamily="49" charset="0"/>
-                </a:rPr>
-                <a:t>joined_string</a:t>
-              </a:r>
-              <a:r>
-                <a:rPr lang="en-US" sz="1400" kern="1200" baseline="0" dirty="0">
-                  <a:latin typeface="Consolas" panose="020B0609020204030204" pitchFamily="49" charset="0"/>
-                  <a:cs typeface="Consolas" panose="020B0609020204030204" pitchFamily="49" charset="0"/>
-                </a:rPr>
-                <a:t>" {</a:t>
-              </a:r>
-              <a:endParaRPr lang="en-US" sz="1400" kern="1200" dirty="0">
+          <a:prstGeom prst="rect">
+            <a:avLst/>
+          </a:prstGeom>
+        </p:spPr>
+        <p:style>
+          <a:lnRef idx="0">
+            <a:scrgbClr r="0" g="0" b="0"/>
+          </a:lnRef>
+          <a:fillRef idx="0">
+            <a:scrgbClr r="0" g="0" b="0"/>
+          </a:fillRef>
+          <a:effectRef idx="0">
+            <a:scrgbClr r="0" g="0" b="0"/>
+          </a:effectRef>
+          <a:fontRef idx="minor">
+            <a:schemeClr val="tx1">
+              <a:hueOff val="0"/>
+              <a:satOff val="0"/>
+              <a:lumOff val="0"/>
+              <a:alphaOff val="0"/>
+            </a:schemeClr>
+          </a:fontRef>
+        </p:style>
+        <p:txBody>
+          <a:bodyPr spcFirstLastPara="0" vert="horz" wrap="square" lIns="0" tIns="0" rIns="0" bIns="0" numCol="1" spcCol="1270" anchor="t" anchorCtr="0">
+            <a:noAutofit/>
+          </a:bodyPr>
+          <a:lstStyle/>
+          <a:p>
+            <a:pPr marL="0" lvl="0" indent="0" algn="l" defTabSz="488950">
+              <a:lnSpc>
+                <a:spcPct val="100000"/>
+              </a:lnSpc>
+              <a:spcBef>
+                <a:spcPct val="0"/>
+              </a:spcBef>
+              <a:spcAft>
+                <a:spcPct val="35000"/>
+              </a:spcAft>
+              <a:buNone/>
+            </a:pPr>
+            <a:r>
+              <a:rPr lang="en-US" sz="1400" i="1" kern="1200" baseline="0" dirty="0"/>
+              <a:t>join(): Combines list elements into a single string.</a:t>
+            </a:r>
+            <a:endParaRPr lang="en-US" sz="1400" kern="1200" dirty="0"/>
+          </a:p>
+          <a:p>
+            <a:pPr marL="57150" lvl="1" indent="-57150" algn="l" defTabSz="488950">
+              <a:lnSpc>
+                <a:spcPct val="90000"/>
+              </a:lnSpc>
+              <a:spcBef>
+                <a:spcPct val="0"/>
+              </a:spcBef>
+              <a:spcAft>
+                <a:spcPct val="15000"/>
+              </a:spcAft>
+              <a:buNone/>
+            </a:pPr>
+            <a:r>
+              <a:rPr lang="en-US" sz="1400" kern="1200" baseline="0" dirty="0">
                 <a:latin typeface="Consolas" panose="020B0609020204030204" pitchFamily="49" charset="0"/>
                 <a:cs typeface="Consolas" panose="020B0609020204030204" pitchFamily="49" charset="0"/>
-              </a:endParaRPr>
-            </a:p>
-            <a:p>
-              <a:pPr marL="57150" lvl="1" indent="-57150" algn="l" defTabSz="488950">
-                <a:lnSpc>
-                  <a:spcPct val="90000"/>
-                </a:lnSpc>
-                <a:spcBef>
-                  <a:spcPct val="0"/>
-                </a:spcBef>
-                <a:spcAft>
-                  <a:spcPct val="15000"/>
-                </a:spcAft>
-                <a:buNone/>
-              </a:pPr>
-              <a:r>
-                <a:rPr lang="en-US" sz="1400" dirty="0">
-                  <a:latin typeface="Consolas" panose="020B0609020204030204" pitchFamily="49" charset="0"/>
-                  <a:cs typeface="Consolas" panose="020B0609020204030204" pitchFamily="49" charset="0"/>
-                </a:rPr>
-                <a:t>  </a:t>
-              </a:r>
-              <a:r>
-                <a:rPr lang="en-US" sz="1400" kern="1200" baseline="0" dirty="0">
-                  <a:latin typeface="Consolas" panose="020B0609020204030204" pitchFamily="49" charset="0"/>
-                  <a:cs typeface="Consolas" panose="020B0609020204030204" pitchFamily="49" charset="0"/>
-                </a:rPr>
-                <a:t>value = join(", ", ["dev", "staging", "prod"])</a:t>
-              </a:r>
-              <a:endParaRPr lang="en-US" sz="1400" kern="1200" dirty="0">
+              </a:rPr>
+              <a:t>output "</a:t>
+            </a:r>
+            <a:r>
+              <a:rPr lang="en-US" sz="1400" kern="1200" baseline="0" dirty="0" err="1">
                 <a:latin typeface="Consolas" panose="020B0609020204030204" pitchFamily="49" charset="0"/>
                 <a:cs typeface="Consolas" panose="020B0609020204030204" pitchFamily="49" charset="0"/>
-              </a:endParaRPr>
-            </a:p>
-            <a:p>
-              <a:pPr marL="57150" lvl="1" indent="-57150" algn="l" defTabSz="488950">
-                <a:lnSpc>
-                  <a:spcPct val="90000"/>
-                </a:lnSpc>
-                <a:spcBef>
-                  <a:spcPct val="0"/>
-                </a:spcBef>
-                <a:spcAft>
-                  <a:spcPct val="15000"/>
-                </a:spcAft>
-                <a:buNone/>
-              </a:pPr>
-              <a:r>
-                <a:rPr lang="en-US" sz="1400" kern="1200" baseline="0" dirty="0">
-                  <a:latin typeface="Consolas" panose="020B0609020204030204" pitchFamily="49" charset="0"/>
-                  <a:cs typeface="Consolas" panose="020B0609020204030204" pitchFamily="49" charset="0"/>
-                </a:rPr>
-                <a:t>}</a:t>
-              </a:r>
-              <a:endParaRPr lang="en-US" sz="1400" kern="1200" dirty="0">
+              </a:rPr>
+              <a:t>joined_string</a:t>
+            </a:r>
+            <a:r>
+              <a:rPr lang="en-US" sz="1400" kern="1200" baseline="0" dirty="0">
                 <a:latin typeface="Consolas" panose="020B0609020204030204" pitchFamily="49" charset="0"/>
                 <a:cs typeface="Consolas" panose="020B0609020204030204" pitchFamily="49" charset="0"/>
-              </a:endParaRPr>
-            </a:p>
-            <a:p>
-              <a:pPr marL="0" lvl="0" indent="0" algn="l" defTabSz="488950">
-                <a:lnSpc>
-                  <a:spcPct val="100000"/>
-                </a:lnSpc>
-                <a:spcBef>
-                  <a:spcPct val="0"/>
-                </a:spcBef>
-                <a:spcAft>
-                  <a:spcPct val="35000"/>
-                </a:spcAft>
-                <a:buNone/>
-              </a:pPr>
-              <a:r>
-                <a:rPr lang="en-US" sz="1400" i="1" kern="1200" baseline="0" dirty="0"/>
-                <a:t>length(): Returns the number of items in a list.</a:t>
-              </a:r>
-              <a:endParaRPr lang="en-US" sz="1400" kern="1200" dirty="0"/>
-            </a:p>
-            <a:p>
-              <a:pPr marL="0" lvl="1" algn="l" defTabSz="488950">
-                <a:lnSpc>
-                  <a:spcPct val="90000"/>
-                </a:lnSpc>
-                <a:spcBef>
-                  <a:spcPct val="0"/>
-                </a:spcBef>
-                <a:spcAft>
-                  <a:spcPct val="15000"/>
-                </a:spcAft>
-              </a:pPr>
-              <a:r>
-                <a:rPr lang="en-US" sz="1400" kern="1200" baseline="0" dirty="0">
-                  <a:latin typeface="Consolas" panose="020B0609020204030204" pitchFamily="49" charset="0"/>
-                  <a:cs typeface="Consolas" panose="020B0609020204030204" pitchFamily="49" charset="0"/>
-                </a:rPr>
-                <a:t>output "</a:t>
-              </a:r>
-              <a:r>
-                <a:rPr lang="en-US" sz="1400" kern="1200" baseline="0" dirty="0" err="1">
-                  <a:latin typeface="Consolas" panose="020B0609020204030204" pitchFamily="49" charset="0"/>
-                  <a:cs typeface="Consolas" panose="020B0609020204030204" pitchFamily="49" charset="0"/>
-                </a:rPr>
-                <a:t>list_length</a:t>
-              </a:r>
-              <a:r>
-                <a:rPr lang="en-US" sz="1400" kern="1200" baseline="0" dirty="0">
-                  <a:latin typeface="Consolas" panose="020B0609020204030204" pitchFamily="49" charset="0"/>
-                  <a:cs typeface="Consolas" panose="020B0609020204030204" pitchFamily="49" charset="0"/>
-                </a:rPr>
-                <a:t>" {</a:t>
-              </a:r>
-              <a:endParaRPr lang="en-US" sz="1400" kern="1200" dirty="0">
+              </a:rPr>
+              <a:t>" {</a:t>
+            </a:r>
+            <a:endParaRPr lang="en-US" sz="1400" kern="1200" dirty="0">
+              <a:latin typeface="Consolas" panose="020B0609020204030204" pitchFamily="49" charset="0"/>
+              <a:cs typeface="Consolas" panose="020B0609020204030204" pitchFamily="49" charset="0"/>
+            </a:endParaRPr>
+          </a:p>
+          <a:p>
+            <a:pPr marL="57150" lvl="1" indent="-57150" algn="l" defTabSz="488950">
+              <a:lnSpc>
+                <a:spcPct val="90000"/>
+              </a:lnSpc>
+              <a:spcBef>
+                <a:spcPct val="0"/>
+              </a:spcBef>
+              <a:spcAft>
+                <a:spcPct val="15000"/>
+              </a:spcAft>
+              <a:buNone/>
+            </a:pPr>
+            <a:r>
+              <a:rPr lang="en-US" sz="1400" dirty="0">
                 <a:latin typeface="Consolas" panose="020B0609020204030204" pitchFamily="49" charset="0"/>
                 <a:cs typeface="Consolas" panose="020B0609020204030204" pitchFamily="49" charset="0"/>
-              </a:endParaRPr>
-            </a:p>
-            <a:p>
-              <a:pPr marL="0" lvl="1" algn="l" defTabSz="488950">
-                <a:lnSpc>
-                  <a:spcPct val="90000"/>
-                </a:lnSpc>
-                <a:spcBef>
-                  <a:spcPct val="0"/>
-                </a:spcBef>
-                <a:spcAft>
-                  <a:spcPct val="15000"/>
-                </a:spcAft>
-              </a:pPr>
-              <a:r>
-                <a:rPr lang="en-US" sz="1400" kern="1200" baseline="0" dirty="0">
-                  <a:latin typeface="Consolas" panose="020B0609020204030204" pitchFamily="49" charset="0"/>
-                  <a:cs typeface="Consolas" panose="020B0609020204030204" pitchFamily="49" charset="0"/>
-                </a:rPr>
-                <a:t>  value = length(["dev", "staging", "prod"])</a:t>
-              </a:r>
-              <a:endParaRPr lang="en-US" sz="1400" kern="1200" dirty="0">
+              </a:rPr>
+              <a:t>  </a:t>
+            </a:r>
+            <a:r>
+              <a:rPr lang="en-US" sz="1400" kern="1200" baseline="0" dirty="0">
                 <a:latin typeface="Consolas" panose="020B0609020204030204" pitchFamily="49" charset="0"/>
                 <a:cs typeface="Consolas" panose="020B0609020204030204" pitchFamily="49" charset="0"/>
-              </a:endParaRPr>
-            </a:p>
-            <a:p>
-              <a:pPr marL="0" lvl="1" algn="l" defTabSz="488950">
-                <a:lnSpc>
-                  <a:spcPct val="90000"/>
-                </a:lnSpc>
-                <a:spcBef>
-                  <a:spcPct val="0"/>
-                </a:spcBef>
-                <a:spcAft>
-                  <a:spcPct val="15000"/>
-                </a:spcAft>
-              </a:pPr>
-              <a:r>
-                <a:rPr lang="en-US" sz="1400" kern="1200" baseline="0" dirty="0">
-                  <a:latin typeface="Consolas" panose="020B0609020204030204" pitchFamily="49" charset="0"/>
-                  <a:cs typeface="Consolas" panose="020B0609020204030204" pitchFamily="49" charset="0"/>
-                </a:rPr>
-                <a:t>}</a:t>
-              </a:r>
-              <a:endParaRPr lang="en-US" sz="1400" kern="1200" dirty="0">
+              </a:rPr>
+              <a:t>value = join(", ", ["dev", "staging", "prod"])</a:t>
+            </a:r>
+            <a:endParaRPr lang="en-US" sz="1400" kern="1200" dirty="0">
+              <a:latin typeface="Consolas" panose="020B0609020204030204" pitchFamily="49" charset="0"/>
+              <a:cs typeface="Consolas" panose="020B0609020204030204" pitchFamily="49" charset="0"/>
+            </a:endParaRPr>
+          </a:p>
+          <a:p>
+            <a:pPr marL="57150" lvl="1" indent="-57150" algn="l" defTabSz="488950">
+              <a:lnSpc>
+                <a:spcPct val="90000"/>
+              </a:lnSpc>
+              <a:spcBef>
+                <a:spcPct val="0"/>
+              </a:spcBef>
+              <a:spcAft>
+                <a:spcPct val="15000"/>
+              </a:spcAft>
+              <a:buNone/>
+            </a:pPr>
+            <a:r>
+              <a:rPr lang="en-US" sz="1400" kern="1200" baseline="0" dirty="0">
                 <a:latin typeface="Consolas" panose="020B0609020204030204" pitchFamily="49" charset="0"/>
                 <a:cs typeface="Consolas" panose="020B0609020204030204" pitchFamily="49" charset="0"/>
-              </a:endParaRPr>
-            </a:p>
-            <a:p>
-              <a:pPr marL="0" lvl="0" indent="0" algn="l" defTabSz="488950">
-                <a:lnSpc>
-                  <a:spcPct val="100000"/>
-                </a:lnSpc>
-                <a:spcBef>
-                  <a:spcPct val="0"/>
-                </a:spcBef>
-                <a:spcAft>
-                  <a:spcPct val="35000"/>
-                </a:spcAft>
-                <a:buNone/>
-              </a:pPr>
-              <a:r>
-                <a:rPr lang="en-US" sz="1400" i="1" kern="1200" baseline="0" dirty="0"/>
-                <a:t>conditionals: Perform logic based on conditions.</a:t>
-              </a:r>
-              <a:endParaRPr lang="en-US" sz="1400" kern="1200" dirty="0"/>
-            </a:p>
-            <a:p>
-              <a:pPr marL="0" lvl="1" algn="l" defTabSz="488950">
-                <a:lnSpc>
-                  <a:spcPct val="90000"/>
-                </a:lnSpc>
-                <a:spcBef>
-                  <a:spcPct val="0"/>
-                </a:spcBef>
-                <a:spcAft>
-                  <a:spcPct val="15000"/>
-                </a:spcAft>
-              </a:pPr>
-              <a:r>
-                <a:rPr lang="en-US" sz="1400" kern="1200" baseline="0" dirty="0">
-                  <a:latin typeface="Consolas" panose="020B0609020204030204" pitchFamily="49" charset="0"/>
-                  <a:cs typeface="Consolas" panose="020B0609020204030204" pitchFamily="49" charset="0"/>
-                </a:rPr>
-                <a:t>output "</a:t>
-              </a:r>
-              <a:r>
-                <a:rPr lang="en-US" sz="1400" kern="1200" baseline="0" dirty="0" err="1">
-                  <a:latin typeface="Consolas" panose="020B0609020204030204" pitchFamily="49" charset="0"/>
-                  <a:cs typeface="Consolas" panose="020B0609020204030204" pitchFamily="49" charset="0"/>
-                </a:rPr>
-                <a:t>vm_size</a:t>
-              </a:r>
-              <a:r>
-                <a:rPr lang="en-US" sz="1400" kern="1200" baseline="0" dirty="0">
-                  <a:latin typeface="Consolas" panose="020B0609020204030204" pitchFamily="49" charset="0"/>
-                  <a:cs typeface="Consolas" panose="020B0609020204030204" pitchFamily="49" charset="0"/>
-                </a:rPr>
-                <a:t>" {</a:t>
-              </a:r>
-              <a:endParaRPr lang="en-US" sz="1400" kern="1200" dirty="0">
+              </a:rPr>
+              <a:t>}</a:t>
+            </a:r>
+            <a:endParaRPr lang="en-US" sz="1400" kern="1200" dirty="0">
+              <a:latin typeface="Consolas" panose="020B0609020204030204" pitchFamily="49" charset="0"/>
+              <a:cs typeface="Consolas" panose="020B0609020204030204" pitchFamily="49" charset="0"/>
+            </a:endParaRPr>
+          </a:p>
+          <a:p>
+            <a:pPr marL="0" lvl="0" indent="0" algn="l" defTabSz="488950">
+              <a:lnSpc>
+                <a:spcPct val="100000"/>
+              </a:lnSpc>
+              <a:spcBef>
+                <a:spcPct val="0"/>
+              </a:spcBef>
+              <a:spcAft>
+                <a:spcPct val="35000"/>
+              </a:spcAft>
+              <a:buNone/>
+            </a:pPr>
+            <a:r>
+              <a:rPr lang="en-US" sz="1400" i="1" kern="1200" baseline="0" dirty="0"/>
+              <a:t>length(): Returns the number of items in a list.</a:t>
+            </a:r>
+            <a:endParaRPr lang="en-US" sz="1400" kern="1200" dirty="0"/>
+          </a:p>
+          <a:p>
+            <a:pPr marL="0" lvl="1" algn="l" defTabSz="488950">
+              <a:lnSpc>
+                <a:spcPct val="90000"/>
+              </a:lnSpc>
+              <a:spcBef>
+                <a:spcPct val="0"/>
+              </a:spcBef>
+              <a:spcAft>
+                <a:spcPct val="15000"/>
+              </a:spcAft>
+            </a:pPr>
+            <a:r>
+              <a:rPr lang="en-US" sz="1400" kern="1200" baseline="0" dirty="0">
                 <a:latin typeface="Consolas" panose="020B0609020204030204" pitchFamily="49" charset="0"/>
                 <a:cs typeface="Consolas" panose="020B0609020204030204" pitchFamily="49" charset="0"/>
-              </a:endParaRPr>
-            </a:p>
-            <a:p>
-              <a:pPr marL="0" lvl="1" algn="l" defTabSz="488950">
-                <a:lnSpc>
-                  <a:spcPct val="90000"/>
-                </a:lnSpc>
-                <a:spcBef>
-                  <a:spcPct val="0"/>
-                </a:spcBef>
-                <a:spcAft>
-                  <a:spcPct val="15000"/>
-                </a:spcAft>
-              </a:pPr>
-              <a:r>
-                <a:rPr lang="en-US" sz="1400" kern="1200" baseline="0" dirty="0">
-                  <a:latin typeface="Consolas" panose="020B0609020204030204" pitchFamily="49" charset="0"/>
-                  <a:cs typeface="Consolas" panose="020B0609020204030204" pitchFamily="49" charset="0"/>
-                </a:rPr>
-                <a:t>  value = </a:t>
-              </a:r>
-              <a:r>
-                <a:rPr lang="en-US" sz="1400" kern="1200" baseline="0" dirty="0" err="1">
-                  <a:latin typeface="Consolas" panose="020B0609020204030204" pitchFamily="49" charset="0"/>
-                  <a:cs typeface="Consolas" panose="020B0609020204030204" pitchFamily="49" charset="0"/>
-                </a:rPr>
-                <a:t>var.environment</a:t>
-              </a:r>
-              <a:r>
-                <a:rPr lang="en-US" sz="1400" kern="1200" baseline="0" dirty="0">
-                  <a:latin typeface="Consolas" panose="020B0609020204030204" pitchFamily="49" charset="0"/>
-                  <a:cs typeface="Consolas" panose="020B0609020204030204" pitchFamily="49" charset="0"/>
-                </a:rPr>
-                <a:t> == "prod" ? "Standard_DS2_v2" : "Standard_DS1_v2"</a:t>
-              </a:r>
-              <a:endParaRPr lang="en-US" sz="1400" kern="1200" dirty="0">
+              </a:rPr>
+              <a:t>output "</a:t>
+            </a:r>
+            <a:r>
+              <a:rPr lang="en-US" sz="1400" kern="1200" baseline="0" dirty="0" err="1">
                 <a:latin typeface="Consolas" panose="020B0609020204030204" pitchFamily="49" charset="0"/>
                 <a:cs typeface="Consolas" panose="020B0609020204030204" pitchFamily="49" charset="0"/>
-              </a:endParaRPr>
-            </a:p>
-            <a:p>
-              <a:pPr marL="0" lvl="1" algn="l" defTabSz="488950">
-                <a:lnSpc>
-                  <a:spcPct val="90000"/>
-                </a:lnSpc>
-                <a:spcBef>
-                  <a:spcPct val="0"/>
-                </a:spcBef>
-                <a:spcAft>
-                  <a:spcPct val="15000"/>
-                </a:spcAft>
-              </a:pPr>
-              <a:r>
-                <a:rPr lang="en-US" sz="1400" kern="1200" baseline="0" dirty="0">
-                  <a:latin typeface="Consolas" panose="020B0609020204030204" pitchFamily="49" charset="0"/>
-                  <a:cs typeface="Consolas" panose="020B0609020204030204" pitchFamily="49" charset="0"/>
-                </a:rPr>
-                <a:t>}</a:t>
-              </a:r>
-              <a:endParaRPr lang="en-US" sz="1400" kern="1200" dirty="0">
+              </a:rPr>
+              <a:t>list_length</a:t>
+            </a:r>
+            <a:r>
+              <a:rPr lang="en-US" sz="1400" kern="1200" baseline="0" dirty="0">
                 <a:latin typeface="Consolas" panose="020B0609020204030204" pitchFamily="49" charset="0"/>
                 <a:cs typeface="Consolas" panose="020B0609020204030204" pitchFamily="49" charset="0"/>
-              </a:endParaRPr>
-            </a:p>
-          </p:txBody>
-        </p:sp>
-      </p:grpSp>
+              </a:rPr>
+              <a:t>" {</a:t>
+            </a:r>
+            <a:endParaRPr lang="en-US" sz="1400" kern="1200" dirty="0">
+              <a:latin typeface="Consolas" panose="020B0609020204030204" pitchFamily="49" charset="0"/>
+              <a:cs typeface="Consolas" panose="020B0609020204030204" pitchFamily="49" charset="0"/>
+            </a:endParaRPr>
+          </a:p>
+          <a:p>
+            <a:pPr marL="0" lvl="1" algn="l" defTabSz="488950">
+              <a:lnSpc>
+                <a:spcPct val="90000"/>
+              </a:lnSpc>
+              <a:spcBef>
+                <a:spcPct val="0"/>
+              </a:spcBef>
+              <a:spcAft>
+                <a:spcPct val="15000"/>
+              </a:spcAft>
+            </a:pPr>
+            <a:r>
+              <a:rPr lang="en-US" sz="1400" kern="1200" baseline="0" dirty="0">
+                <a:latin typeface="Consolas" panose="020B0609020204030204" pitchFamily="49" charset="0"/>
+                <a:cs typeface="Consolas" panose="020B0609020204030204" pitchFamily="49" charset="0"/>
+              </a:rPr>
+              <a:t>  value = length(["dev", "staging", "prod"])</a:t>
+            </a:r>
+            <a:endParaRPr lang="en-US" sz="1400" kern="1200" dirty="0">
+              <a:latin typeface="Consolas" panose="020B0609020204030204" pitchFamily="49" charset="0"/>
+              <a:cs typeface="Consolas" panose="020B0609020204030204" pitchFamily="49" charset="0"/>
+            </a:endParaRPr>
+          </a:p>
+          <a:p>
+            <a:pPr marL="0" lvl="1" algn="l" defTabSz="488950">
+              <a:lnSpc>
+                <a:spcPct val="90000"/>
+              </a:lnSpc>
+              <a:spcBef>
+                <a:spcPct val="0"/>
+              </a:spcBef>
+              <a:spcAft>
+                <a:spcPct val="15000"/>
+              </a:spcAft>
+            </a:pPr>
+            <a:r>
+              <a:rPr lang="en-US" sz="1400" kern="1200" baseline="0" dirty="0">
+                <a:latin typeface="Consolas" panose="020B0609020204030204" pitchFamily="49" charset="0"/>
+                <a:cs typeface="Consolas" panose="020B0609020204030204" pitchFamily="49" charset="0"/>
+              </a:rPr>
+              <a:t>}</a:t>
+            </a:r>
+            <a:endParaRPr lang="en-US" sz="1400" kern="1200" dirty="0">
+              <a:latin typeface="Consolas" panose="020B0609020204030204" pitchFamily="49" charset="0"/>
+              <a:cs typeface="Consolas" panose="020B0609020204030204" pitchFamily="49" charset="0"/>
+            </a:endParaRPr>
+          </a:p>
+          <a:p>
+            <a:pPr marL="0" lvl="0" indent="0" algn="l" defTabSz="488950">
+              <a:lnSpc>
+                <a:spcPct val="100000"/>
+              </a:lnSpc>
+              <a:spcBef>
+                <a:spcPct val="0"/>
+              </a:spcBef>
+              <a:spcAft>
+                <a:spcPct val="35000"/>
+              </a:spcAft>
+              <a:buNone/>
+            </a:pPr>
+            <a:r>
+              <a:rPr lang="en-US" sz="1400" i="1" kern="1200" baseline="0" dirty="0"/>
+              <a:t>conditionals: Perform logic based on conditions.</a:t>
+            </a:r>
+            <a:endParaRPr lang="en-US" sz="1400" kern="1200" dirty="0"/>
+          </a:p>
+          <a:p>
+            <a:pPr marL="0" lvl="1" algn="l" defTabSz="488950">
+              <a:lnSpc>
+                <a:spcPct val="90000"/>
+              </a:lnSpc>
+              <a:spcBef>
+                <a:spcPct val="0"/>
+              </a:spcBef>
+              <a:spcAft>
+                <a:spcPct val="15000"/>
+              </a:spcAft>
+            </a:pPr>
+            <a:r>
+              <a:rPr lang="en-US" sz="1400" kern="1200" baseline="0" dirty="0">
+                <a:latin typeface="Consolas" panose="020B0609020204030204" pitchFamily="49" charset="0"/>
+                <a:cs typeface="Consolas" panose="020B0609020204030204" pitchFamily="49" charset="0"/>
+              </a:rPr>
+              <a:t>output "</a:t>
+            </a:r>
+            <a:r>
+              <a:rPr lang="en-US" sz="1400" kern="1200" baseline="0" dirty="0" err="1">
+                <a:latin typeface="Consolas" panose="020B0609020204030204" pitchFamily="49" charset="0"/>
+                <a:cs typeface="Consolas" panose="020B0609020204030204" pitchFamily="49" charset="0"/>
+              </a:rPr>
+              <a:t>vm_size</a:t>
+            </a:r>
+            <a:r>
+              <a:rPr lang="en-US" sz="1400" kern="1200" baseline="0" dirty="0">
+                <a:latin typeface="Consolas" panose="020B0609020204030204" pitchFamily="49" charset="0"/>
+                <a:cs typeface="Consolas" panose="020B0609020204030204" pitchFamily="49" charset="0"/>
+              </a:rPr>
+              <a:t>" {</a:t>
+            </a:r>
+            <a:endParaRPr lang="en-US" sz="1400" kern="1200" dirty="0">
+              <a:latin typeface="Consolas" panose="020B0609020204030204" pitchFamily="49" charset="0"/>
+              <a:cs typeface="Consolas" panose="020B0609020204030204" pitchFamily="49" charset="0"/>
+            </a:endParaRPr>
+          </a:p>
+          <a:p>
+            <a:pPr marL="0" lvl="1" algn="l" defTabSz="488950">
+              <a:lnSpc>
+                <a:spcPct val="90000"/>
+              </a:lnSpc>
+              <a:spcBef>
+                <a:spcPct val="0"/>
+              </a:spcBef>
+              <a:spcAft>
+                <a:spcPct val="15000"/>
+              </a:spcAft>
+            </a:pPr>
+            <a:r>
+              <a:rPr lang="en-US" sz="1400" kern="1200" baseline="0" dirty="0">
+                <a:latin typeface="Consolas" panose="020B0609020204030204" pitchFamily="49" charset="0"/>
+                <a:cs typeface="Consolas" panose="020B0609020204030204" pitchFamily="49" charset="0"/>
+              </a:rPr>
+              <a:t>  value = </a:t>
+            </a:r>
+            <a:r>
+              <a:rPr lang="en-US" sz="1400" kern="1200" baseline="0" dirty="0" err="1">
+                <a:latin typeface="Consolas" panose="020B0609020204030204" pitchFamily="49" charset="0"/>
+                <a:cs typeface="Consolas" panose="020B0609020204030204" pitchFamily="49" charset="0"/>
+              </a:rPr>
+              <a:t>var.environment</a:t>
+            </a:r>
+            <a:r>
+              <a:rPr lang="en-US" sz="1400" kern="1200" baseline="0" dirty="0">
+                <a:latin typeface="Consolas" panose="020B0609020204030204" pitchFamily="49" charset="0"/>
+                <a:cs typeface="Consolas" panose="020B0609020204030204" pitchFamily="49" charset="0"/>
+              </a:rPr>
+              <a:t> == "prod" ? "Standard_DS2_v2" : "Standard_DS1_v2"</a:t>
+            </a:r>
+            <a:endParaRPr lang="en-US" sz="1400" kern="1200" dirty="0">
+              <a:latin typeface="Consolas" panose="020B0609020204030204" pitchFamily="49" charset="0"/>
+              <a:cs typeface="Consolas" panose="020B0609020204030204" pitchFamily="49" charset="0"/>
+            </a:endParaRPr>
+          </a:p>
+          <a:p>
+            <a:pPr marL="0" lvl="1" algn="l" defTabSz="488950">
+              <a:lnSpc>
+                <a:spcPct val="90000"/>
+              </a:lnSpc>
+              <a:spcBef>
+                <a:spcPct val="0"/>
+              </a:spcBef>
+              <a:spcAft>
+                <a:spcPct val="15000"/>
+              </a:spcAft>
+            </a:pPr>
+            <a:r>
+              <a:rPr lang="en-US" sz="1400" kern="1200" baseline="0" dirty="0">
+                <a:latin typeface="Consolas" panose="020B0609020204030204" pitchFamily="49" charset="0"/>
+                <a:cs typeface="Consolas" panose="020B0609020204030204" pitchFamily="49" charset="0"/>
+              </a:rPr>
+              <a:t>}</a:t>
+            </a:r>
+            <a:endParaRPr lang="en-US" sz="1400" kern="1200" dirty="0">
+              <a:latin typeface="Consolas" panose="020B0609020204030204" pitchFamily="49" charset="0"/>
+              <a:cs typeface="Consolas" panose="020B0609020204030204" pitchFamily="49" charset="0"/>
+            </a:endParaRPr>
+          </a:p>
+        </p:txBody>
+      </p:sp>
     </p:spTree>
     <p:extLst>
       <p:ext uri="{BB962C8B-B14F-4D97-AF65-F5344CB8AC3E}">
@@ -13409,8 +13604,8 @@
         </p:nvSpPr>
         <p:spPr>
           <a:xfrm>
-            <a:off x="5100824" y="2286000"/>
-            <a:ext cx="6176776" cy="3581400"/>
+            <a:off x="5100824" y="2285999"/>
+            <a:ext cx="6828364" cy="4376057"/>
           </a:xfrm>
         </p:spPr>
         <p:txBody>
@@ -13419,118 +13614,124 @@
           </a:bodyPr>
           <a:lstStyle/>
           <a:p>
-            <a:r>
-              <a:rPr lang="en-US" sz="1100"/>
-              <a:t>Objective: Implement provisioners to install a web server on a VM and use functions to make configuration dynamic based on the environment.</a:t>
-            </a:r>
-          </a:p>
-          <a:p>
-            <a:r>
-              <a:rPr lang="en-US" sz="1100"/>
+            <a:pPr marL="0" indent="0">
+              <a:buNone/>
+            </a:pPr>
+            <a:r>
+              <a:rPr lang="en-US" sz="1400" b="1" dirty="0"/>
+              <a:t>Objective</a:t>
+            </a:r>
+            <a:r>
+              <a:rPr lang="en-US" sz="1400" dirty="0"/>
+              <a:t>: Implement provisioners to install a web server on a VM and use functions to make configuration dynamic based on the environment.</a:t>
+            </a:r>
+          </a:p>
+          <a:p>
+            <a:pPr marL="0" indent="0">
+              <a:buNone/>
+            </a:pPr>
+            <a:r>
+              <a:rPr lang="en-US" sz="1400" dirty="0"/>
               <a:t>Steps:</a:t>
             </a:r>
           </a:p>
           <a:p>
+            <a:r>
+              <a:rPr lang="en-US" sz="1400" dirty="0"/>
+              <a:t>Provision a Virtual Machine:</a:t>
+            </a:r>
+          </a:p>
+          <a:p>
             <a:pPr lvl="1"/>
             <a:r>
-              <a:rPr lang="en-US" sz="1100"/>
-              <a:t>Provision a Virtual Machine:</a:t>
-            </a:r>
-          </a:p>
-          <a:p>
-            <a:pPr lvl="2"/>
-            <a:r>
-              <a:rPr lang="en-US" sz="1100"/>
+              <a:rPr lang="en-US" sz="1600" dirty="0"/>
               <a:t>Define a virtual machine in Azure and use the remote-exec provisioner to install Nginx.</a:t>
             </a:r>
           </a:p>
           <a:p>
+            <a:r>
+              <a:rPr lang="en-US" sz="1400" dirty="0"/>
+              <a:t>Use Terraform Functions:</a:t>
+            </a:r>
+          </a:p>
+          <a:p>
             <a:pPr lvl="1"/>
             <a:r>
-              <a:rPr lang="en-US" sz="1100"/>
-              <a:t>Use Terraform Functions:</a:t>
-            </a:r>
-          </a:p>
-          <a:p>
-            <a:pPr lvl="2"/>
-            <a:r>
-              <a:rPr lang="en-US" sz="1100"/>
+              <a:rPr lang="en-US" sz="1600" dirty="0"/>
               <a:t>Use a function like </a:t>
             </a:r>
             <a:r>
-              <a:rPr lang="en-US" sz="1100">
+              <a:rPr lang="en-US" sz="1600" dirty="0">
                 <a:latin typeface="Consolas" panose="020B0609020204030204" pitchFamily="49" charset="0"/>
                 <a:cs typeface="Consolas" panose="020B0609020204030204" pitchFamily="49" charset="0"/>
               </a:rPr>
               <a:t>length() </a:t>
             </a:r>
             <a:r>
-              <a:rPr lang="en-US" sz="1100"/>
+              <a:rPr lang="en-US" sz="1600" dirty="0"/>
               <a:t>to calculate the size of a list, and use a conditional expression to set the size of the virtual machine based on the environment.</a:t>
             </a:r>
           </a:p>
           <a:p>
+            <a:r>
+              <a:rPr lang="en-US" sz="1400" dirty="0"/>
+              <a:t>Switch Workspaces:</a:t>
+            </a:r>
+          </a:p>
+          <a:p>
             <a:pPr lvl="1"/>
             <a:r>
-              <a:rPr lang="en-US" sz="1100"/>
-              <a:t>Switch Workspaces:</a:t>
-            </a:r>
-          </a:p>
-          <a:p>
-            <a:pPr lvl="2"/>
-            <a:r>
-              <a:rPr lang="en-US" sz="1100"/>
+              <a:rPr lang="en-US" sz="1600" dirty="0"/>
               <a:t>Create separate workspaces for </a:t>
             </a:r>
             <a:r>
-              <a:rPr lang="en-US" sz="1100">
+              <a:rPr lang="en-US" sz="1600" dirty="0">
                 <a:latin typeface="Consolas" panose="020B0609020204030204" pitchFamily="49" charset="0"/>
                 <a:cs typeface="Consolas" panose="020B0609020204030204" pitchFamily="49" charset="0"/>
               </a:rPr>
               <a:t>dev</a:t>
             </a:r>
             <a:r>
-              <a:rPr lang="en-US" sz="1100"/>
+              <a:rPr lang="en-US" sz="1600" dirty="0"/>
               <a:t> and </a:t>
             </a:r>
             <a:r>
-              <a:rPr lang="en-US" sz="1100">
+              <a:rPr lang="en-US" sz="1600" dirty="0">
                 <a:latin typeface="Consolas" panose="020B0609020204030204" pitchFamily="49" charset="0"/>
                 <a:cs typeface="Consolas" panose="020B0609020204030204" pitchFamily="49" charset="0"/>
               </a:rPr>
               <a:t>prod</a:t>
             </a:r>
             <a:r>
-              <a:rPr lang="en-US" sz="1100"/>
+              <a:rPr lang="en-US" sz="1600" dirty="0"/>
               <a:t> and apply the configuration in each environment.</a:t>
             </a:r>
           </a:p>
           <a:p>
-            <a:pPr lvl="1"/>
-            <a:r>
-              <a:rPr lang="en-US" sz="1100"/>
+            <a:r>
+              <a:rPr lang="en-US" sz="1400" dirty="0"/>
               <a:t>Run </a:t>
             </a:r>
             <a:r>
-              <a:rPr lang="en-US" sz="1100">
+              <a:rPr lang="en-US" sz="1400" dirty="0">
                 <a:latin typeface="Consolas" panose="020B0609020204030204" pitchFamily="49" charset="0"/>
                 <a:cs typeface="Consolas" panose="020B0609020204030204" pitchFamily="49" charset="0"/>
               </a:rPr>
               <a:t>terraform plan </a:t>
             </a:r>
             <a:r>
-              <a:rPr lang="en-US" sz="1100"/>
+              <a:rPr lang="en-US" sz="1400" dirty="0"/>
               <a:t>and </a:t>
             </a:r>
             <a:r>
-              <a:rPr lang="en-US" sz="1100">
+              <a:rPr lang="en-US" sz="1400" dirty="0">
                 <a:latin typeface="Consolas" panose="020B0609020204030204" pitchFamily="49" charset="0"/>
                 <a:cs typeface="Consolas" panose="020B0609020204030204" pitchFamily="49" charset="0"/>
               </a:rPr>
               <a:t>terraform apply </a:t>
             </a:r>
             <a:r>
-              <a:rPr lang="en-US" sz="1100"/>
+              <a:rPr lang="en-US" sz="1400" dirty="0"/>
               <a:t>to verify the setup.</a:t>
             </a:r>
           </a:p>

</xml_diff>